<commit_message>
Latest Update to presentation
Current missing material from Suhas. All others added to main
presentation.
</commit_message>
<xml_diff>
--- a/ProposalPresentation/Proposal.pptx
+++ b/ProposalPresentation/Proposal.pptx
@@ -5,16 +5,22 @@
     <p:sldMasterId id="2147483690" r:id="rId1"/>
   </p:sldMasterIdLst>
   <p:notesMasterIdLst>
-    <p:notesMasterId r:id="rId9"/>
+    <p:notesMasterId r:id="rId15"/>
   </p:notesMasterIdLst>
   <p:sldIdLst>
     <p:sldId id="256" r:id="rId2"/>
     <p:sldId id="257" r:id="rId3"/>
     <p:sldId id="258" r:id="rId4"/>
-    <p:sldId id="259" r:id="rId5"/>
-    <p:sldId id="260" r:id="rId6"/>
-    <p:sldId id="261" r:id="rId7"/>
-    <p:sldId id="262" r:id="rId8"/>
+    <p:sldId id="263" r:id="rId5"/>
+    <p:sldId id="264" r:id="rId6"/>
+    <p:sldId id="265" r:id="rId7"/>
+    <p:sldId id="259" r:id="rId8"/>
+    <p:sldId id="268" r:id="rId9"/>
+    <p:sldId id="269" r:id="rId10"/>
+    <p:sldId id="270" r:id="rId11"/>
+    <p:sldId id="271" r:id="rId12"/>
+    <p:sldId id="261" r:id="rId13"/>
+    <p:sldId id="267" r:id="rId14"/>
   </p:sldIdLst>
   <p:sldSz cx="12192000" cy="6858000"/>
   <p:notesSz cx="6858000" cy="9144000"/>
@@ -203,7 +209,7 @@
           <a:p>
             <a:fld id="{196649D2-8F6F-483E-9FFD-996F9FA14F8E}" type="datetimeFigureOut">
               <a:rPr lang="en-US" smtClean="0"/>
-              <a:t>10/2/2016</a:t>
+              <a:t>10/3/2016</a:t>
             </a:fld>
             <a:endParaRPr lang="en-US"/>
           </a:p>
@@ -556,7 +562,7 @@
           <a:p>
             <a:fld id="{693B9949-4082-4E9D-BF06-D5CAF1E713C7}" type="slidenum">
               <a:rPr lang="en-US" smtClean="0"/>
-              <a:t>4</a:t>
+              <a:t>7</a:t>
             </a:fld>
             <a:endParaRPr lang="en-US"/>
           </a:p>
@@ -743,7 +749,7 @@
           <a:p>
             <a:fld id="{063EE82C-7EBD-4CD0-9EA0-6671C904F8AE}" type="datetimeFigureOut">
               <a:rPr lang="en-US" smtClean="0"/>
-              <a:t>10/2/2016</a:t>
+              <a:t>10/3/2016</a:t>
             </a:fld>
             <a:endParaRPr lang="en-US"/>
           </a:p>
@@ -976,7 +982,7 @@
           <a:p>
             <a:fld id="{063EE82C-7EBD-4CD0-9EA0-6671C904F8AE}" type="datetimeFigureOut">
               <a:rPr lang="en-US" smtClean="0"/>
-              <a:t>10/2/2016</a:t>
+              <a:t>10/3/2016</a:t>
             </a:fld>
             <a:endParaRPr lang="en-US"/>
           </a:p>
@@ -1156,7 +1162,7 @@
           <a:p>
             <a:fld id="{063EE82C-7EBD-4CD0-9EA0-6671C904F8AE}" type="datetimeFigureOut">
               <a:rPr lang="en-US" smtClean="0"/>
-              <a:t>10/2/2016</a:t>
+              <a:t>10/3/2016</a:t>
             </a:fld>
             <a:endParaRPr lang="en-US"/>
           </a:p>
@@ -1331,7 +1337,7 @@
           <a:p>
             <a:fld id="{063EE82C-7EBD-4CD0-9EA0-6671C904F8AE}" type="datetimeFigureOut">
               <a:rPr lang="en-US" smtClean="0"/>
-              <a:t>10/2/2016</a:t>
+              <a:t>10/3/2016</a:t>
             </a:fld>
             <a:endParaRPr lang="en-US"/>
           </a:p>
@@ -1585,7 +1591,7 @@
           <a:p>
             <a:fld id="{063EE82C-7EBD-4CD0-9EA0-6671C904F8AE}" type="datetimeFigureOut">
               <a:rPr lang="en-US" smtClean="0"/>
-              <a:t>10/2/2016</a:t>
+              <a:t>10/3/2016</a:t>
             </a:fld>
             <a:endParaRPr lang="en-US"/>
           </a:p>
@@ -1916,7 +1922,7 @@
           <a:p>
             <a:fld id="{063EE82C-7EBD-4CD0-9EA0-6671C904F8AE}" type="datetimeFigureOut">
               <a:rPr lang="en-US" smtClean="0"/>
-              <a:t>10/2/2016</a:t>
+              <a:t>10/3/2016</a:t>
             </a:fld>
             <a:endParaRPr lang="en-US"/>
           </a:p>
@@ -2367,7 +2373,7 @@
           <a:p>
             <a:fld id="{063EE82C-7EBD-4CD0-9EA0-6671C904F8AE}" type="datetimeFigureOut">
               <a:rPr lang="en-US" smtClean="0"/>
-              <a:t>10/2/2016</a:t>
+              <a:t>10/3/2016</a:t>
             </a:fld>
             <a:endParaRPr lang="en-US"/>
           </a:p>
@@ -2485,7 +2491,7 @@
           <a:p>
             <a:fld id="{063EE82C-7EBD-4CD0-9EA0-6671C904F8AE}" type="datetimeFigureOut">
               <a:rPr lang="en-US" smtClean="0"/>
-              <a:t>10/2/2016</a:t>
+              <a:t>10/3/2016</a:t>
             </a:fld>
             <a:endParaRPr lang="en-US"/>
           </a:p>
@@ -2580,7 +2586,7 @@
           <a:p>
             <a:fld id="{063EE82C-7EBD-4CD0-9EA0-6671C904F8AE}" type="datetimeFigureOut">
               <a:rPr lang="en-US" smtClean="0"/>
-              <a:t>10/2/2016</a:t>
+              <a:t>10/3/2016</a:t>
             </a:fld>
             <a:endParaRPr lang="en-US"/>
           </a:p>
@@ -2867,7 +2873,7 @@
           <a:p>
             <a:fld id="{063EE82C-7EBD-4CD0-9EA0-6671C904F8AE}" type="datetimeFigureOut">
               <a:rPr lang="en-US" smtClean="0"/>
-              <a:t>10/2/2016</a:t>
+              <a:t>10/3/2016</a:t>
             </a:fld>
             <a:endParaRPr lang="en-US"/>
           </a:p>
@@ -3189,7 +3195,7 @@
           <a:p>
             <a:fld id="{063EE82C-7EBD-4CD0-9EA0-6671C904F8AE}" type="datetimeFigureOut">
               <a:rPr lang="en-US" smtClean="0"/>
-              <a:t>10/2/2016</a:t>
+              <a:t>10/3/2016</a:t>
             </a:fld>
             <a:endParaRPr lang="en-US"/>
           </a:p>
@@ -3443,7 +3449,7 @@
           <a:p>
             <a:fld id="{063EE82C-7EBD-4CD0-9EA0-6671C904F8AE}" type="datetimeFigureOut">
               <a:rPr lang="en-US" smtClean="0"/>
-              <a:t>10/2/2016</a:t>
+              <a:t>10/3/2016</a:t>
             </a:fld>
             <a:endParaRPr lang="en-US"/>
           </a:p>
@@ -4002,6 +4008,1891 @@
 </p:sld>
 </file>
 
+<file path=ppt/slides/slide10.xml><?xml version="1.0" encoding="utf-8"?>
+<p:sld xmlns:a="http://schemas.openxmlformats.org/drawingml/2006/main" xmlns:r="http://schemas.openxmlformats.org/officeDocument/2006/relationships" xmlns:p="http://schemas.openxmlformats.org/presentationml/2006/main">
+  <p:cSld>
+    <p:spTree>
+      <p:nvGrpSpPr>
+        <p:cNvPr id="1" name=""/>
+        <p:cNvGrpSpPr/>
+        <p:nvPr/>
+      </p:nvGrpSpPr>
+      <p:grpSpPr>
+        <a:xfrm>
+          <a:off x="0" y="0"/>
+          <a:ext cx="0" cy="0"/>
+          <a:chOff x="0" y="0"/>
+          <a:chExt cx="0" cy="0"/>
+        </a:xfrm>
+      </p:grpSpPr>
+      <p:sp>
+        <p:nvSpPr>
+          <p:cNvPr id="2" name="Title 1"/>
+          <p:cNvSpPr>
+            <a:spLocks noGrp="1"/>
+          </p:cNvSpPr>
+          <p:nvPr>
+            <p:ph type="title"/>
+          </p:nvPr>
+        </p:nvSpPr>
+        <p:spPr/>
+        <p:txBody>
+          <a:bodyPr/>
+          <a:lstStyle/>
+          <a:p>
+            <a:r>
+              <a:rPr lang="en-US" dirty="0" smtClean="0"/>
+              <a:t>Experiment 3</a:t>
+            </a:r>
+            <a:endParaRPr lang="en-US" dirty="0"/>
+          </a:p>
+        </p:txBody>
+      </p:sp>
+      <p:sp>
+        <p:nvSpPr>
+          <p:cNvPr id="3" name="Content Placeholder 2"/>
+          <p:cNvSpPr>
+            <a:spLocks noGrp="1"/>
+          </p:cNvSpPr>
+          <p:nvPr>
+            <p:ph idx="1"/>
+          </p:nvPr>
+        </p:nvSpPr>
+        <p:spPr/>
+        <p:txBody>
+          <a:bodyPr/>
+          <a:lstStyle/>
+          <a:p>
+            <a:r>
+              <a:rPr lang="en-US" dirty="0" smtClean="0"/>
+              <a:t>What </a:t>
+            </a:r>
+            <a:r>
+              <a:rPr lang="en-US" dirty="0"/>
+              <a:t>granularity we can expect from eye movement </a:t>
+            </a:r>
+            <a:r>
+              <a:rPr lang="en-US" dirty="0" smtClean="0"/>
+              <a:t>data</a:t>
+            </a:r>
+          </a:p>
+          <a:p>
+            <a:r>
+              <a:rPr lang="en-US" dirty="0" smtClean="0"/>
+              <a:t>Assumption: User looks at screen during experiment</a:t>
+            </a:r>
+          </a:p>
+          <a:p>
+            <a:r>
+              <a:rPr lang="en-US" dirty="0" smtClean="0"/>
+              <a:t>Divide screen into 2 by 2, 3 by 3, and so on doing experiment until the accuracy is around 50 percent</a:t>
+            </a:r>
+          </a:p>
+          <a:p>
+            <a:r>
+              <a:rPr lang="en-US" dirty="0" smtClean="0"/>
+              <a:t>User looks at one rectangle and eye tracker give the one they think user is looking at </a:t>
+            </a:r>
+            <a:endParaRPr lang="en-US" dirty="0"/>
+          </a:p>
+          <a:p>
+            <a:pPr marL="0" marR="0" lvl="0" indent="0" defTabSz="914400" eaLnBrk="1" fontAlgn="auto" latinLnBrk="0" hangingPunct="1">
+              <a:lnSpc>
+                <a:spcPct val="100000"/>
+              </a:lnSpc>
+              <a:spcBef>
+                <a:spcPts val="0"/>
+              </a:spcBef>
+              <a:spcAft>
+                <a:spcPts val="0"/>
+              </a:spcAft>
+              <a:buClrTx/>
+              <a:buSzTx/>
+              <a:buFontTx/>
+              <a:buNone/>
+              <a:tabLst/>
+              <a:defRPr/>
+            </a:pPr>
+            <a:endParaRPr lang="en-US" dirty="0"/>
+          </a:p>
+        </p:txBody>
+      </p:sp>
+    </p:spTree>
+    <p:extLst>
+      <p:ext uri="{BB962C8B-B14F-4D97-AF65-F5344CB8AC3E}">
+        <p14:creationId xmlns:p14="http://schemas.microsoft.com/office/powerpoint/2010/main" val="2104047068"/>
+      </p:ext>
+    </p:extLst>
+  </p:cSld>
+  <p:clrMapOvr>
+    <a:masterClrMapping/>
+  </p:clrMapOvr>
+</p:sld>
+</file>
+
+<file path=ppt/slides/slide11.xml><?xml version="1.0" encoding="utf-8"?>
+<p:sld xmlns:a="http://schemas.openxmlformats.org/drawingml/2006/main" xmlns:r="http://schemas.openxmlformats.org/officeDocument/2006/relationships" xmlns:p="http://schemas.openxmlformats.org/presentationml/2006/main">
+  <p:cSld>
+    <p:spTree>
+      <p:nvGrpSpPr>
+        <p:cNvPr id="1" name=""/>
+        <p:cNvGrpSpPr/>
+        <p:nvPr/>
+      </p:nvGrpSpPr>
+      <p:grpSpPr>
+        <a:xfrm>
+          <a:off x="0" y="0"/>
+          <a:ext cx="0" cy="0"/>
+          <a:chOff x="0" y="0"/>
+          <a:chExt cx="0" cy="0"/>
+        </a:xfrm>
+      </p:grpSpPr>
+      <p:sp>
+        <p:nvSpPr>
+          <p:cNvPr id="2" name="Title 1"/>
+          <p:cNvSpPr>
+            <a:spLocks noGrp="1"/>
+          </p:cNvSpPr>
+          <p:nvPr>
+            <p:ph type="title"/>
+          </p:nvPr>
+        </p:nvSpPr>
+        <p:spPr/>
+        <p:txBody>
+          <a:bodyPr/>
+          <a:lstStyle/>
+          <a:p>
+            <a:r>
+              <a:rPr lang="en-US" dirty="0" smtClean="0"/>
+              <a:t>Experiment 4</a:t>
+            </a:r>
+            <a:endParaRPr lang="en-US" dirty="0"/>
+          </a:p>
+        </p:txBody>
+      </p:sp>
+      <p:sp>
+        <p:nvSpPr>
+          <p:cNvPr id="3" name="Content Placeholder 2"/>
+          <p:cNvSpPr>
+            <a:spLocks noGrp="1"/>
+          </p:cNvSpPr>
+          <p:nvPr>
+            <p:ph idx="1"/>
+          </p:nvPr>
+        </p:nvSpPr>
+        <p:spPr/>
+        <p:txBody>
+          <a:bodyPr/>
+          <a:lstStyle/>
+          <a:p>
+            <a:r>
+              <a:rPr lang="en-US" dirty="0" smtClean="0"/>
+              <a:t>Does tracking </a:t>
+            </a:r>
+            <a:r>
+              <a:rPr lang="en-US" dirty="0"/>
+              <a:t>the flow of </a:t>
+            </a:r>
+            <a:r>
+              <a:rPr lang="en-US" dirty="0" smtClean="0"/>
+              <a:t>user’s </a:t>
+            </a:r>
+            <a:r>
+              <a:rPr lang="en-US" dirty="0"/>
+              <a:t>actual </a:t>
+            </a:r>
+            <a:r>
+              <a:rPr lang="en-US" dirty="0" smtClean="0"/>
+              <a:t>reading</a:t>
+            </a:r>
+          </a:p>
+          <a:p>
+            <a:r>
+              <a:rPr lang="en-US" dirty="0" smtClean="0"/>
+              <a:t>Highly depends on the result of experiment 3</a:t>
+            </a:r>
+          </a:p>
+          <a:p>
+            <a:r>
+              <a:rPr lang="en-US" dirty="0" smtClean="0"/>
+              <a:t>Assumption: </a:t>
+            </a:r>
+            <a:r>
+              <a:rPr lang="en-US" dirty="0"/>
+              <a:t>User </a:t>
+            </a:r>
+            <a:r>
+              <a:rPr lang="en-US" dirty="0" smtClean="0"/>
+              <a:t>reads the article during experiment and does not get distract</a:t>
+            </a:r>
+          </a:p>
+          <a:p>
+            <a:r>
+              <a:rPr lang="en-US" dirty="0" smtClean="0"/>
+              <a:t>Highlight words which software thinks user is reading </a:t>
+            </a:r>
+          </a:p>
+          <a:p>
+            <a:r>
+              <a:rPr lang="en-US" dirty="0" smtClean="0"/>
+              <a:t>Design a questionnaire to collect user’s feedback</a:t>
+            </a:r>
+          </a:p>
+          <a:p>
+            <a:endParaRPr lang="en-US" dirty="0" smtClean="0"/>
+          </a:p>
+          <a:p>
+            <a:endParaRPr lang="en-US" dirty="0" smtClean="0"/>
+          </a:p>
+          <a:p>
+            <a:endParaRPr lang="en-US" dirty="0" smtClean="0"/>
+          </a:p>
+          <a:p>
+            <a:endParaRPr lang="en-US" dirty="0"/>
+          </a:p>
+        </p:txBody>
+      </p:sp>
+    </p:spTree>
+    <p:extLst>
+      <p:ext uri="{BB962C8B-B14F-4D97-AF65-F5344CB8AC3E}">
+        <p14:creationId xmlns:p14="http://schemas.microsoft.com/office/powerpoint/2010/main" val="3457332150"/>
+      </p:ext>
+    </p:extLst>
+  </p:cSld>
+  <p:clrMapOvr>
+    <a:masterClrMapping/>
+  </p:clrMapOvr>
+</p:sld>
+</file>
+
+<file path=ppt/slides/slide12.xml><?xml version="1.0" encoding="utf-8"?>
+<p:sld xmlns:a="http://schemas.openxmlformats.org/drawingml/2006/main" xmlns:r="http://schemas.openxmlformats.org/officeDocument/2006/relationships" xmlns:p="http://schemas.openxmlformats.org/presentationml/2006/main">
+  <p:cSld>
+    <p:spTree>
+      <p:nvGrpSpPr>
+        <p:cNvPr id="1" name=""/>
+        <p:cNvGrpSpPr/>
+        <p:nvPr/>
+      </p:nvGrpSpPr>
+      <p:grpSpPr>
+        <a:xfrm>
+          <a:off x="0" y="0"/>
+          <a:ext cx="0" cy="0"/>
+          <a:chOff x="0" y="0"/>
+          <a:chExt cx="0" cy="0"/>
+        </a:xfrm>
+      </p:grpSpPr>
+      <p:sp>
+        <p:nvSpPr>
+          <p:cNvPr id="2" name="Title 1"/>
+          <p:cNvSpPr>
+            <a:spLocks noGrp="1"/>
+          </p:cNvSpPr>
+          <p:nvPr>
+            <p:ph type="title"/>
+          </p:nvPr>
+        </p:nvSpPr>
+        <p:spPr/>
+        <p:txBody>
+          <a:bodyPr/>
+          <a:lstStyle/>
+          <a:p>
+            <a:r>
+              <a:rPr lang="en-US" smtClean="0"/>
+              <a:t>Demo</a:t>
+            </a:r>
+            <a:endParaRPr lang="en-US"/>
+          </a:p>
+        </p:txBody>
+      </p:sp>
+      <p:sp>
+        <p:nvSpPr>
+          <p:cNvPr id="3" name="Content Placeholder 2"/>
+          <p:cNvSpPr>
+            <a:spLocks noGrp="1"/>
+          </p:cNvSpPr>
+          <p:nvPr>
+            <p:ph idx="1"/>
+          </p:nvPr>
+        </p:nvSpPr>
+        <p:spPr/>
+        <p:txBody>
+          <a:bodyPr/>
+          <a:lstStyle/>
+          <a:p>
+            <a:r>
+              <a:rPr lang="en-US" dirty="0" smtClean="0"/>
+              <a:t>Best Case</a:t>
+            </a:r>
+          </a:p>
+          <a:p>
+            <a:pPr lvl="1"/>
+            <a:r>
+              <a:rPr lang="en-US" dirty="0" smtClean="0"/>
+              <a:t>Set up a profile and allow person to look through a piece of text where the eye movements are tracked accurately</a:t>
+            </a:r>
+          </a:p>
+          <a:p>
+            <a:endParaRPr lang="en-US" dirty="0"/>
+          </a:p>
+          <a:p>
+            <a:r>
+              <a:rPr lang="en-US" dirty="0" err="1" smtClean="0"/>
+              <a:t>Suhas</a:t>
+            </a:r>
+            <a:endParaRPr lang="en-US" dirty="0" smtClean="0"/>
+          </a:p>
+          <a:p>
+            <a:endParaRPr lang="en-US" dirty="0"/>
+          </a:p>
+        </p:txBody>
+      </p:sp>
+    </p:spTree>
+    <p:extLst>
+      <p:ext uri="{BB962C8B-B14F-4D97-AF65-F5344CB8AC3E}">
+        <p14:creationId xmlns:p14="http://schemas.microsoft.com/office/powerpoint/2010/main" val="747479787"/>
+      </p:ext>
+    </p:extLst>
+  </p:cSld>
+  <p:clrMapOvr>
+    <a:masterClrMapping/>
+  </p:clrMapOvr>
+  <p:timing>
+    <p:tnLst>
+      <p:par>
+        <p:cTn id="1" dur="indefinite" restart="never" nodeType="tmRoot"/>
+      </p:par>
+    </p:tnLst>
+  </p:timing>
+</p:sld>
+</file>
+
+<file path=ppt/slides/slide13.xml><?xml version="1.0" encoding="utf-8"?>
+<p:sld xmlns:a="http://schemas.openxmlformats.org/drawingml/2006/main" xmlns:r="http://schemas.openxmlformats.org/officeDocument/2006/relationships" xmlns:p="http://schemas.openxmlformats.org/presentationml/2006/main">
+  <p:cSld>
+    <p:spTree>
+      <p:nvGrpSpPr>
+        <p:cNvPr id="1" name=""/>
+        <p:cNvGrpSpPr/>
+        <p:nvPr/>
+      </p:nvGrpSpPr>
+      <p:grpSpPr>
+        <a:xfrm>
+          <a:off x="0" y="0"/>
+          <a:ext cx="0" cy="0"/>
+          <a:chOff x="0" y="0"/>
+          <a:chExt cx="0" cy="0"/>
+        </a:xfrm>
+      </p:grpSpPr>
+      <p:sp>
+        <p:nvSpPr>
+          <p:cNvPr id="2" name="Title 1"/>
+          <p:cNvSpPr>
+            <a:spLocks noGrp="1"/>
+          </p:cNvSpPr>
+          <p:nvPr>
+            <p:ph type="title"/>
+          </p:nvPr>
+        </p:nvSpPr>
+        <p:spPr/>
+        <p:txBody>
+          <a:bodyPr/>
+          <a:lstStyle/>
+          <a:p>
+            <a:r>
+              <a:rPr lang="en-US" smtClean="0"/>
+              <a:t>Milestones</a:t>
+            </a:r>
+            <a:endParaRPr lang="en-US"/>
+          </a:p>
+        </p:txBody>
+      </p:sp>
+      <p:graphicFrame>
+        <p:nvGraphicFramePr>
+          <p:cNvPr id="7" name="Content Placeholder 6"/>
+          <p:cNvGraphicFramePr>
+            <a:graphicFrameLocks noGrp="1"/>
+          </p:cNvGraphicFramePr>
+          <p:nvPr>
+            <p:ph idx="1"/>
+            <p:extLst/>
+          </p:nvPr>
+        </p:nvGraphicFramePr>
+        <p:xfrm>
+          <a:off x="762142" y="2255934"/>
+          <a:ext cx="9417685" cy="2225040"/>
+        </p:xfrm>
+        <a:graphic>
+          <a:graphicData uri="http://schemas.openxmlformats.org/drawingml/2006/table">
+            <a:tbl>
+              <a:tblPr firstRow="1" bandRow="1">
+                <a:tableStyleId>{5C22544A-7EE6-4342-B048-85BDC9FD1C3A}</a:tableStyleId>
+              </a:tblPr>
+              <a:tblGrid>
+                <a:gridCol w="5205730"/>
+                <a:gridCol w="1371600"/>
+                <a:gridCol w="1468755"/>
+                <a:gridCol w="1371600"/>
+              </a:tblGrid>
+              <a:tr h="370840">
+                <a:tc>
+                  <a:txBody>
+                    <a:bodyPr/>
+                    <a:lstStyle/>
+                    <a:p>
+                      <a:pPr algn="ctr"/>
+                      <a:r>
+                        <a:rPr lang="en-US" sz="1400" dirty="0" smtClean="0">
+                          <a:solidFill>
+                            <a:schemeClr val="tx1"/>
+                          </a:solidFill>
+                        </a:rPr>
+                        <a:t>Tasks</a:t>
+                      </a:r>
+                      <a:endParaRPr lang="en-US" sz="1400" dirty="0">
+                        <a:solidFill>
+                          <a:schemeClr val="tx1"/>
+                        </a:solidFill>
+                      </a:endParaRPr>
+                    </a:p>
+                  </a:txBody>
+                  <a:tcPr anchor="ctr">
+                    <a:lnL w="12700" cap="flat" cmpd="sng" algn="ctr">
+                      <a:solidFill>
+                        <a:schemeClr val="tx1"/>
+                      </a:solidFill>
+                      <a:prstDash val="solid"/>
+                      <a:round/>
+                      <a:headEnd type="none" w="med" len="med"/>
+                      <a:tailEnd type="none" w="med" len="med"/>
+                    </a:lnL>
+                    <a:lnR w="12700" cap="flat" cmpd="sng" algn="ctr">
+                      <a:solidFill>
+                        <a:schemeClr val="tx1"/>
+                      </a:solidFill>
+                      <a:prstDash val="solid"/>
+                      <a:round/>
+                      <a:headEnd type="none" w="med" len="med"/>
+                      <a:tailEnd type="none" w="med" len="med"/>
+                    </a:lnR>
+                    <a:lnT w="12700" cap="flat" cmpd="sng" algn="ctr">
+                      <a:solidFill>
+                        <a:schemeClr val="tx1"/>
+                      </a:solidFill>
+                      <a:prstDash val="solid"/>
+                      <a:round/>
+                      <a:headEnd type="none" w="med" len="med"/>
+                      <a:tailEnd type="none" w="med" len="med"/>
+                    </a:lnT>
+                    <a:lnB w="12700" cap="flat" cmpd="sng" algn="ctr">
+                      <a:solidFill>
+                        <a:schemeClr val="tx1"/>
+                      </a:solidFill>
+                      <a:prstDash val="solid"/>
+                      <a:round/>
+                      <a:headEnd type="none" w="med" len="med"/>
+                      <a:tailEnd type="none" w="med" len="med"/>
+                    </a:lnB>
+                    <a:solidFill>
+                      <a:schemeClr val="bg1"/>
+                    </a:solidFill>
+                  </a:tcPr>
+                </a:tc>
+                <a:tc>
+                  <a:txBody>
+                    <a:bodyPr/>
+                    <a:lstStyle/>
+                    <a:p>
+                      <a:pPr algn="ctr"/>
+                      <a:r>
+                        <a:rPr lang="en-US" sz="1400" dirty="0" smtClean="0">
+                          <a:solidFill>
+                            <a:schemeClr val="tx1"/>
+                          </a:solidFill>
+                        </a:rPr>
+                        <a:t>October</a:t>
+                      </a:r>
+                      <a:endParaRPr lang="en-US" sz="1400" dirty="0">
+                        <a:solidFill>
+                          <a:schemeClr val="tx1"/>
+                        </a:solidFill>
+                      </a:endParaRPr>
+                    </a:p>
+                  </a:txBody>
+                  <a:tcPr anchor="ctr">
+                    <a:lnL w="12700" cap="flat" cmpd="sng" algn="ctr">
+                      <a:solidFill>
+                        <a:schemeClr val="tx1"/>
+                      </a:solidFill>
+                      <a:prstDash val="solid"/>
+                      <a:round/>
+                      <a:headEnd type="none" w="med" len="med"/>
+                      <a:tailEnd type="none" w="med" len="med"/>
+                    </a:lnL>
+                    <a:lnR w="12700" cap="flat" cmpd="sng" algn="ctr">
+                      <a:solidFill>
+                        <a:schemeClr val="tx1"/>
+                      </a:solidFill>
+                      <a:prstDash val="solid"/>
+                      <a:round/>
+                      <a:headEnd type="none" w="med" len="med"/>
+                      <a:tailEnd type="none" w="med" len="med"/>
+                    </a:lnR>
+                    <a:lnT w="12700" cap="flat" cmpd="sng" algn="ctr">
+                      <a:solidFill>
+                        <a:schemeClr val="tx1"/>
+                      </a:solidFill>
+                      <a:prstDash val="solid"/>
+                      <a:round/>
+                      <a:headEnd type="none" w="med" len="med"/>
+                      <a:tailEnd type="none" w="med" len="med"/>
+                    </a:lnT>
+                    <a:lnB w="12700" cap="flat" cmpd="sng" algn="ctr">
+                      <a:solidFill>
+                        <a:schemeClr val="tx1"/>
+                      </a:solidFill>
+                      <a:prstDash val="solid"/>
+                      <a:round/>
+                      <a:headEnd type="none" w="med" len="med"/>
+                      <a:tailEnd type="none" w="med" len="med"/>
+                    </a:lnB>
+                    <a:solidFill>
+                      <a:schemeClr val="bg1"/>
+                    </a:solidFill>
+                  </a:tcPr>
+                </a:tc>
+                <a:tc>
+                  <a:txBody>
+                    <a:bodyPr/>
+                    <a:lstStyle/>
+                    <a:p>
+                      <a:pPr algn="ctr"/>
+                      <a:r>
+                        <a:rPr lang="en-US" sz="1400" dirty="0" smtClean="0">
+                          <a:solidFill>
+                            <a:schemeClr val="tx1"/>
+                          </a:solidFill>
+                        </a:rPr>
+                        <a:t>November</a:t>
+                      </a:r>
+                      <a:endParaRPr lang="en-US" sz="1400" dirty="0">
+                        <a:solidFill>
+                          <a:schemeClr val="tx1"/>
+                        </a:solidFill>
+                      </a:endParaRPr>
+                    </a:p>
+                  </a:txBody>
+                  <a:tcPr anchor="ctr">
+                    <a:lnL w="12700" cap="flat" cmpd="sng" algn="ctr">
+                      <a:solidFill>
+                        <a:schemeClr val="tx1"/>
+                      </a:solidFill>
+                      <a:prstDash val="solid"/>
+                      <a:round/>
+                      <a:headEnd type="none" w="med" len="med"/>
+                      <a:tailEnd type="none" w="med" len="med"/>
+                    </a:lnL>
+                    <a:lnR w="12700" cap="flat" cmpd="sng" algn="ctr">
+                      <a:solidFill>
+                        <a:schemeClr val="tx1"/>
+                      </a:solidFill>
+                      <a:prstDash val="solid"/>
+                      <a:round/>
+                      <a:headEnd type="none" w="med" len="med"/>
+                      <a:tailEnd type="none" w="med" len="med"/>
+                    </a:lnR>
+                    <a:lnT w="12700" cap="flat" cmpd="sng" algn="ctr">
+                      <a:solidFill>
+                        <a:schemeClr val="tx1"/>
+                      </a:solidFill>
+                      <a:prstDash val="solid"/>
+                      <a:round/>
+                      <a:headEnd type="none" w="med" len="med"/>
+                      <a:tailEnd type="none" w="med" len="med"/>
+                    </a:lnT>
+                    <a:lnB w="12700" cap="flat" cmpd="sng" algn="ctr">
+                      <a:solidFill>
+                        <a:schemeClr val="tx1"/>
+                      </a:solidFill>
+                      <a:prstDash val="solid"/>
+                      <a:round/>
+                      <a:headEnd type="none" w="med" len="med"/>
+                      <a:tailEnd type="none" w="med" len="med"/>
+                    </a:lnB>
+                    <a:solidFill>
+                      <a:schemeClr val="bg1"/>
+                    </a:solidFill>
+                  </a:tcPr>
+                </a:tc>
+                <a:tc>
+                  <a:txBody>
+                    <a:bodyPr/>
+                    <a:lstStyle/>
+                    <a:p>
+                      <a:pPr algn="ctr"/>
+                      <a:r>
+                        <a:rPr lang="en-US" sz="1400" b="0" dirty="0" smtClean="0">
+                          <a:solidFill>
+                            <a:schemeClr val="tx1"/>
+                          </a:solidFill>
+                        </a:rPr>
+                        <a:t>December</a:t>
+                      </a:r>
+                      <a:endParaRPr lang="en-US" sz="1400" b="0" dirty="0">
+                        <a:solidFill>
+                          <a:schemeClr val="tx1"/>
+                        </a:solidFill>
+                      </a:endParaRPr>
+                    </a:p>
+                  </a:txBody>
+                  <a:tcPr anchor="ctr">
+                    <a:lnL w="12700" cap="flat" cmpd="sng" algn="ctr">
+                      <a:solidFill>
+                        <a:schemeClr val="tx1"/>
+                      </a:solidFill>
+                      <a:prstDash val="solid"/>
+                      <a:round/>
+                      <a:headEnd type="none" w="med" len="med"/>
+                      <a:tailEnd type="none" w="med" len="med"/>
+                    </a:lnL>
+                    <a:lnR w="12700" cap="flat" cmpd="sng" algn="ctr">
+                      <a:solidFill>
+                        <a:schemeClr val="tx1"/>
+                      </a:solidFill>
+                      <a:prstDash val="solid"/>
+                      <a:round/>
+                      <a:headEnd type="none" w="med" len="med"/>
+                      <a:tailEnd type="none" w="med" len="med"/>
+                    </a:lnR>
+                    <a:lnT w="12700" cap="flat" cmpd="sng" algn="ctr">
+                      <a:solidFill>
+                        <a:schemeClr val="tx1"/>
+                      </a:solidFill>
+                      <a:prstDash val="solid"/>
+                      <a:round/>
+                      <a:headEnd type="none" w="med" len="med"/>
+                      <a:tailEnd type="none" w="med" len="med"/>
+                    </a:lnT>
+                    <a:lnB w="12700" cap="flat" cmpd="sng" algn="ctr">
+                      <a:solidFill>
+                        <a:schemeClr val="tx1"/>
+                      </a:solidFill>
+                      <a:prstDash val="solid"/>
+                      <a:round/>
+                      <a:headEnd type="none" w="med" len="med"/>
+                      <a:tailEnd type="none" w="med" len="med"/>
+                    </a:lnB>
+                    <a:solidFill>
+                      <a:schemeClr val="bg1"/>
+                    </a:solidFill>
+                  </a:tcPr>
+                </a:tc>
+              </a:tr>
+              <a:tr h="370840">
+                <a:tc>
+                  <a:txBody>
+                    <a:bodyPr/>
+                    <a:lstStyle/>
+                    <a:p>
+                      <a:pPr algn="l"/>
+                      <a:r>
+                        <a:rPr lang="en-US" sz="1400" dirty="0" smtClean="0">
+                          <a:solidFill>
+                            <a:schemeClr val="tx1"/>
+                          </a:solidFill>
+                        </a:rPr>
+                        <a:t>Programming</a:t>
+                      </a:r>
+                      <a:r>
+                        <a:rPr lang="en-US" sz="1400" baseline="0" dirty="0" smtClean="0">
+                          <a:solidFill>
+                            <a:schemeClr val="tx1"/>
+                          </a:solidFill>
+                        </a:rPr>
+                        <a:t> to get correct output from Eye tracking sensor</a:t>
+                      </a:r>
+                      <a:endParaRPr lang="en-US" sz="1400" dirty="0">
+                        <a:solidFill>
+                          <a:schemeClr val="tx1"/>
+                        </a:solidFill>
+                      </a:endParaRPr>
+                    </a:p>
+                  </a:txBody>
+                  <a:tcPr anchor="ctr">
+                    <a:lnL w="12700" cap="flat" cmpd="sng" algn="ctr">
+                      <a:solidFill>
+                        <a:schemeClr val="tx1"/>
+                      </a:solidFill>
+                      <a:prstDash val="solid"/>
+                      <a:round/>
+                      <a:headEnd type="none" w="med" len="med"/>
+                      <a:tailEnd type="none" w="med" len="med"/>
+                    </a:lnL>
+                    <a:lnR w="12700" cap="flat" cmpd="sng" algn="ctr">
+                      <a:solidFill>
+                        <a:schemeClr val="tx1"/>
+                      </a:solidFill>
+                      <a:prstDash val="solid"/>
+                      <a:round/>
+                      <a:headEnd type="none" w="med" len="med"/>
+                      <a:tailEnd type="none" w="med" len="med"/>
+                    </a:lnR>
+                    <a:lnT w="12700" cap="flat" cmpd="sng" algn="ctr">
+                      <a:solidFill>
+                        <a:schemeClr val="tx1"/>
+                      </a:solidFill>
+                      <a:prstDash val="solid"/>
+                      <a:round/>
+                      <a:headEnd type="none" w="med" len="med"/>
+                      <a:tailEnd type="none" w="med" len="med"/>
+                    </a:lnT>
+                    <a:lnB w="12700" cap="flat" cmpd="sng" algn="ctr">
+                      <a:solidFill>
+                        <a:schemeClr val="tx1"/>
+                      </a:solidFill>
+                      <a:prstDash val="solid"/>
+                      <a:round/>
+                      <a:headEnd type="none" w="med" len="med"/>
+                      <a:tailEnd type="none" w="med" len="med"/>
+                    </a:lnB>
+                    <a:solidFill>
+                      <a:schemeClr val="bg1"/>
+                    </a:solidFill>
+                  </a:tcPr>
+                </a:tc>
+                <a:tc>
+                  <a:txBody>
+                    <a:bodyPr/>
+                    <a:lstStyle/>
+                    <a:p>
+                      <a:pPr algn="ctr"/>
+                      <a:endParaRPr lang="en-US" sz="1400" dirty="0">
+                        <a:solidFill>
+                          <a:schemeClr val="tx1"/>
+                        </a:solidFill>
+                      </a:endParaRPr>
+                    </a:p>
+                  </a:txBody>
+                  <a:tcPr anchor="ctr">
+                    <a:lnL w="12700" cap="flat" cmpd="sng" algn="ctr">
+                      <a:solidFill>
+                        <a:schemeClr val="tx1"/>
+                      </a:solidFill>
+                      <a:prstDash val="solid"/>
+                      <a:round/>
+                      <a:headEnd type="none" w="med" len="med"/>
+                      <a:tailEnd type="none" w="med" len="med"/>
+                    </a:lnL>
+                    <a:lnR w="12700" cap="flat" cmpd="sng" algn="ctr">
+                      <a:solidFill>
+                        <a:schemeClr val="tx1"/>
+                      </a:solidFill>
+                      <a:prstDash val="solid"/>
+                      <a:round/>
+                      <a:headEnd type="none" w="med" len="med"/>
+                      <a:tailEnd type="none" w="med" len="med"/>
+                    </a:lnR>
+                    <a:lnT w="12700" cap="flat" cmpd="sng" algn="ctr">
+                      <a:solidFill>
+                        <a:schemeClr val="tx1"/>
+                      </a:solidFill>
+                      <a:prstDash val="solid"/>
+                      <a:round/>
+                      <a:headEnd type="none" w="med" len="med"/>
+                      <a:tailEnd type="none" w="med" len="med"/>
+                    </a:lnT>
+                    <a:lnB w="12700" cap="flat" cmpd="sng" algn="ctr">
+                      <a:solidFill>
+                        <a:schemeClr val="tx1"/>
+                      </a:solidFill>
+                      <a:prstDash val="solid"/>
+                      <a:round/>
+                      <a:headEnd type="none" w="med" len="med"/>
+                      <a:tailEnd type="none" w="med" len="med"/>
+                    </a:lnB>
+                    <a:solidFill>
+                      <a:schemeClr val="tx1">
+                        <a:lumMod val="50000"/>
+                        <a:lumOff val="50000"/>
+                      </a:schemeClr>
+                    </a:solidFill>
+                  </a:tcPr>
+                </a:tc>
+                <a:tc>
+                  <a:txBody>
+                    <a:bodyPr/>
+                    <a:lstStyle/>
+                    <a:p>
+                      <a:pPr algn="ctr"/>
+                      <a:endParaRPr lang="en-US" sz="1400" dirty="0">
+                        <a:solidFill>
+                          <a:schemeClr val="tx1"/>
+                        </a:solidFill>
+                      </a:endParaRPr>
+                    </a:p>
+                  </a:txBody>
+                  <a:tcPr anchor="ctr">
+                    <a:lnL w="12700" cap="flat" cmpd="sng" algn="ctr">
+                      <a:solidFill>
+                        <a:schemeClr val="tx1"/>
+                      </a:solidFill>
+                      <a:prstDash val="solid"/>
+                      <a:round/>
+                      <a:headEnd type="none" w="med" len="med"/>
+                      <a:tailEnd type="none" w="med" len="med"/>
+                    </a:lnL>
+                    <a:lnR w="12700" cap="flat" cmpd="sng" algn="ctr">
+                      <a:solidFill>
+                        <a:schemeClr val="tx1"/>
+                      </a:solidFill>
+                      <a:prstDash val="solid"/>
+                      <a:round/>
+                      <a:headEnd type="none" w="med" len="med"/>
+                      <a:tailEnd type="none" w="med" len="med"/>
+                    </a:lnR>
+                    <a:lnT w="12700" cap="flat" cmpd="sng" algn="ctr">
+                      <a:solidFill>
+                        <a:schemeClr val="tx1"/>
+                      </a:solidFill>
+                      <a:prstDash val="solid"/>
+                      <a:round/>
+                      <a:headEnd type="none" w="med" len="med"/>
+                      <a:tailEnd type="none" w="med" len="med"/>
+                    </a:lnT>
+                    <a:lnB w="12700" cap="flat" cmpd="sng" algn="ctr">
+                      <a:solidFill>
+                        <a:schemeClr val="tx1"/>
+                      </a:solidFill>
+                      <a:prstDash val="solid"/>
+                      <a:round/>
+                      <a:headEnd type="none" w="med" len="med"/>
+                      <a:tailEnd type="none" w="med" len="med"/>
+                    </a:lnB>
+                    <a:solidFill>
+                      <a:schemeClr val="bg1"/>
+                    </a:solidFill>
+                  </a:tcPr>
+                </a:tc>
+                <a:tc>
+                  <a:txBody>
+                    <a:bodyPr/>
+                    <a:lstStyle/>
+                    <a:p>
+                      <a:pPr algn="ctr"/>
+                      <a:endParaRPr lang="en-US" sz="1400" dirty="0">
+                        <a:solidFill>
+                          <a:schemeClr val="tx1"/>
+                        </a:solidFill>
+                      </a:endParaRPr>
+                    </a:p>
+                  </a:txBody>
+                  <a:tcPr anchor="ctr">
+                    <a:lnL w="12700" cap="flat" cmpd="sng" algn="ctr">
+                      <a:solidFill>
+                        <a:schemeClr val="tx1"/>
+                      </a:solidFill>
+                      <a:prstDash val="solid"/>
+                      <a:round/>
+                      <a:headEnd type="none" w="med" len="med"/>
+                      <a:tailEnd type="none" w="med" len="med"/>
+                    </a:lnL>
+                    <a:lnR w="12700" cap="flat" cmpd="sng" algn="ctr">
+                      <a:solidFill>
+                        <a:schemeClr val="tx1"/>
+                      </a:solidFill>
+                      <a:prstDash val="solid"/>
+                      <a:round/>
+                      <a:headEnd type="none" w="med" len="med"/>
+                      <a:tailEnd type="none" w="med" len="med"/>
+                    </a:lnR>
+                    <a:lnT w="12700" cap="flat" cmpd="sng" algn="ctr">
+                      <a:solidFill>
+                        <a:schemeClr val="tx1"/>
+                      </a:solidFill>
+                      <a:prstDash val="solid"/>
+                      <a:round/>
+                      <a:headEnd type="none" w="med" len="med"/>
+                      <a:tailEnd type="none" w="med" len="med"/>
+                    </a:lnT>
+                    <a:lnB w="12700" cap="flat" cmpd="sng" algn="ctr">
+                      <a:solidFill>
+                        <a:schemeClr val="tx1"/>
+                      </a:solidFill>
+                      <a:prstDash val="solid"/>
+                      <a:round/>
+                      <a:headEnd type="none" w="med" len="med"/>
+                      <a:tailEnd type="none" w="med" len="med"/>
+                    </a:lnB>
+                    <a:solidFill>
+                      <a:schemeClr val="bg1"/>
+                    </a:solidFill>
+                  </a:tcPr>
+                </a:tc>
+              </a:tr>
+              <a:tr h="370840">
+                <a:tc>
+                  <a:txBody>
+                    <a:bodyPr/>
+                    <a:lstStyle/>
+                    <a:p>
+                      <a:pPr algn="l"/>
+                      <a:r>
+                        <a:rPr lang="en-US" sz="1400" dirty="0" smtClean="0">
+                          <a:solidFill>
+                            <a:schemeClr val="tx1"/>
+                          </a:solidFill>
+                        </a:rPr>
+                        <a:t>Programming for</a:t>
+                      </a:r>
+                      <a:r>
+                        <a:rPr lang="en-US" sz="1400" baseline="0" dirty="0" smtClean="0">
+                          <a:solidFill>
+                            <a:schemeClr val="tx1"/>
+                          </a:solidFill>
+                        </a:rPr>
+                        <a:t> object detection </a:t>
+                      </a:r>
+                      <a:endParaRPr lang="en-US" sz="1400" dirty="0">
+                        <a:solidFill>
+                          <a:schemeClr val="tx1"/>
+                        </a:solidFill>
+                      </a:endParaRPr>
+                    </a:p>
+                  </a:txBody>
+                  <a:tcPr anchor="ctr">
+                    <a:lnL w="12700" cap="flat" cmpd="sng" algn="ctr">
+                      <a:solidFill>
+                        <a:schemeClr val="tx1"/>
+                      </a:solidFill>
+                      <a:prstDash val="solid"/>
+                      <a:round/>
+                      <a:headEnd type="none" w="med" len="med"/>
+                      <a:tailEnd type="none" w="med" len="med"/>
+                    </a:lnL>
+                    <a:lnR w="12700" cap="flat" cmpd="sng" algn="ctr">
+                      <a:solidFill>
+                        <a:schemeClr val="tx1"/>
+                      </a:solidFill>
+                      <a:prstDash val="solid"/>
+                      <a:round/>
+                      <a:headEnd type="none" w="med" len="med"/>
+                      <a:tailEnd type="none" w="med" len="med"/>
+                    </a:lnR>
+                    <a:lnT w="12700" cap="flat" cmpd="sng" algn="ctr">
+                      <a:solidFill>
+                        <a:schemeClr val="tx1"/>
+                      </a:solidFill>
+                      <a:prstDash val="solid"/>
+                      <a:round/>
+                      <a:headEnd type="none" w="med" len="med"/>
+                      <a:tailEnd type="none" w="med" len="med"/>
+                    </a:lnT>
+                    <a:lnB w="12700" cap="flat" cmpd="sng" algn="ctr">
+                      <a:solidFill>
+                        <a:schemeClr val="tx1"/>
+                      </a:solidFill>
+                      <a:prstDash val="solid"/>
+                      <a:round/>
+                      <a:headEnd type="none" w="med" len="med"/>
+                      <a:tailEnd type="none" w="med" len="med"/>
+                    </a:lnB>
+                    <a:solidFill>
+                      <a:schemeClr val="bg1"/>
+                    </a:solidFill>
+                  </a:tcPr>
+                </a:tc>
+                <a:tc>
+                  <a:txBody>
+                    <a:bodyPr/>
+                    <a:lstStyle/>
+                    <a:p>
+                      <a:pPr algn="ctr"/>
+                      <a:endParaRPr lang="en-US" sz="1400" dirty="0">
+                        <a:solidFill>
+                          <a:schemeClr val="tx1"/>
+                        </a:solidFill>
+                      </a:endParaRPr>
+                    </a:p>
+                  </a:txBody>
+                  <a:tcPr anchor="ctr">
+                    <a:lnL w="12700" cap="flat" cmpd="sng" algn="ctr">
+                      <a:solidFill>
+                        <a:schemeClr val="tx1"/>
+                      </a:solidFill>
+                      <a:prstDash val="solid"/>
+                      <a:round/>
+                      <a:headEnd type="none" w="med" len="med"/>
+                      <a:tailEnd type="none" w="med" len="med"/>
+                    </a:lnL>
+                    <a:lnR w="12700" cap="flat" cmpd="sng" algn="ctr">
+                      <a:solidFill>
+                        <a:schemeClr val="tx1"/>
+                      </a:solidFill>
+                      <a:prstDash val="solid"/>
+                      <a:round/>
+                      <a:headEnd type="none" w="med" len="med"/>
+                      <a:tailEnd type="none" w="med" len="med"/>
+                    </a:lnR>
+                    <a:lnT w="12700" cap="flat" cmpd="sng" algn="ctr">
+                      <a:solidFill>
+                        <a:schemeClr val="tx1"/>
+                      </a:solidFill>
+                      <a:prstDash val="solid"/>
+                      <a:round/>
+                      <a:headEnd type="none" w="med" len="med"/>
+                      <a:tailEnd type="none" w="med" len="med"/>
+                    </a:lnT>
+                    <a:lnB w="12700" cap="flat" cmpd="sng" algn="ctr">
+                      <a:solidFill>
+                        <a:schemeClr val="tx1"/>
+                      </a:solidFill>
+                      <a:prstDash val="solid"/>
+                      <a:round/>
+                      <a:headEnd type="none" w="med" len="med"/>
+                      <a:tailEnd type="none" w="med" len="med"/>
+                    </a:lnB>
+                    <a:solidFill>
+                      <a:schemeClr val="bg1"/>
+                    </a:solidFill>
+                  </a:tcPr>
+                </a:tc>
+                <a:tc>
+                  <a:txBody>
+                    <a:bodyPr/>
+                    <a:lstStyle/>
+                    <a:p>
+                      <a:pPr algn="ctr"/>
+                      <a:endParaRPr lang="en-US" sz="1400" dirty="0">
+                        <a:solidFill>
+                          <a:schemeClr val="tx1"/>
+                        </a:solidFill>
+                      </a:endParaRPr>
+                    </a:p>
+                  </a:txBody>
+                  <a:tcPr anchor="ctr">
+                    <a:lnL w="12700" cap="flat" cmpd="sng" algn="ctr">
+                      <a:solidFill>
+                        <a:schemeClr val="tx1"/>
+                      </a:solidFill>
+                      <a:prstDash val="solid"/>
+                      <a:round/>
+                      <a:headEnd type="none" w="med" len="med"/>
+                      <a:tailEnd type="none" w="med" len="med"/>
+                    </a:lnL>
+                    <a:lnR w="12700" cap="flat" cmpd="sng" algn="ctr">
+                      <a:solidFill>
+                        <a:schemeClr val="tx1"/>
+                      </a:solidFill>
+                      <a:prstDash val="solid"/>
+                      <a:round/>
+                      <a:headEnd type="none" w="med" len="med"/>
+                      <a:tailEnd type="none" w="med" len="med"/>
+                    </a:lnR>
+                    <a:lnT w="12700" cap="flat" cmpd="sng" algn="ctr">
+                      <a:solidFill>
+                        <a:schemeClr val="tx1"/>
+                      </a:solidFill>
+                      <a:prstDash val="solid"/>
+                      <a:round/>
+                      <a:headEnd type="none" w="med" len="med"/>
+                      <a:tailEnd type="none" w="med" len="med"/>
+                    </a:lnT>
+                    <a:lnB w="12700" cap="flat" cmpd="sng" algn="ctr">
+                      <a:solidFill>
+                        <a:schemeClr val="tx1"/>
+                      </a:solidFill>
+                      <a:prstDash val="solid"/>
+                      <a:round/>
+                      <a:headEnd type="none" w="med" len="med"/>
+                      <a:tailEnd type="none" w="med" len="med"/>
+                    </a:lnB>
+                    <a:solidFill>
+                      <a:schemeClr val="tx1">
+                        <a:lumMod val="50000"/>
+                        <a:lumOff val="50000"/>
+                      </a:schemeClr>
+                    </a:solidFill>
+                  </a:tcPr>
+                </a:tc>
+                <a:tc>
+                  <a:txBody>
+                    <a:bodyPr/>
+                    <a:lstStyle/>
+                    <a:p>
+                      <a:pPr algn="ctr"/>
+                      <a:endParaRPr lang="en-US" sz="1400" dirty="0">
+                        <a:solidFill>
+                          <a:schemeClr val="tx1"/>
+                        </a:solidFill>
+                      </a:endParaRPr>
+                    </a:p>
+                  </a:txBody>
+                  <a:tcPr anchor="ctr">
+                    <a:lnL w="12700" cap="flat" cmpd="sng" algn="ctr">
+                      <a:solidFill>
+                        <a:schemeClr val="tx1"/>
+                      </a:solidFill>
+                      <a:prstDash val="solid"/>
+                      <a:round/>
+                      <a:headEnd type="none" w="med" len="med"/>
+                      <a:tailEnd type="none" w="med" len="med"/>
+                    </a:lnL>
+                    <a:lnR w="12700" cap="flat" cmpd="sng" algn="ctr">
+                      <a:solidFill>
+                        <a:schemeClr val="tx1"/>
+                      </a:solidFill>
+                      <a:prstDash val="solid"/>
+                      <a:round/>
+                      <a:headEnd type="none" w="med" len="med"/>
+                      <a:tailEnd type="none" w="med" len="med"/>
+                    </a:lnR>
+                    <a:lnT w="12700" cap="flat" cmpd="sng" algn="ctr">
+                      <a:solidFill>
+                        <a:schemeClr val="tx1"/>
+                      </a:solidFill>
+                      <a:prstDash val="solid"/>
+                      <a:round/>
+                      <a:headEnd type="none" w="med" len="med"/>
+                      <a:tailEnd type="none" w="med" len="med"/>
+                    </a:lnT>
+                    <a:lnB w="12700" cap="flat" cmpd="sng" algn="ctr">
+                      <a:solidFill>
+                        <a:schemeClr val="tx1"/>
+                      </a:solidFill>
+                      <a:prstDash val="solid"/>
+                      <a:round/>
+                      <a:headEnd type="none" w="med" len="med"/>
+                      <a:tailEnd type="none" w="med" len="med"/>
+                    </a:lnB>
+                    <a:solidFill>
+                      <a:schemeClr val="bg1"/>
+                    </a:solidFill>
+                  </a:tcPr>
+                </a:tc>
+              </a:tr>
+              <a:tr h="370840">
+                <a:tc>
+                  <a:txBody>
+                    <a:bodyPr/>
+                    <a:lstStyle/>
+                    <a:p>
+                      <a:pPr algn="l"/>
+                      <a:r>
+                        <a:rPr lang="en-US" sz="1400" dirty="0" smtClean="0">
+                          <a:solidFill>
+                            <a:schemeClr val="tx1"/>
+                          </a:solidFill>
+                        </a:rPr>
+                        <a:t>Writing first draft of report</a:t>
+                      </a:r>
+                      <a:endParaRPr lang="en-US" sz="1400" dirty="0">
+                        <a:solidFill>
+                          <a:schemeClr val="tx1"/>
+                        </a:solidFill>
+                      </a:endParaRPr>
+                    </a:p>
+                  </a:txBody>
+                  <a:tcPr anchor="ctr">
+                    <a:lnL w="12700" cap="flat" cmpd="sng" algn="ctr">
+                      <a:solidFill>
+                        <a:schemeClr val="tx1"/>
+                      </a:solidFill>
+                      <a:prstDash val="solid"/>
+                      <a:round/>
+                      <a:headEnd type="none" w="med" len="med"/>
+                      <a:tailEnd type="none" w="med" len="med"/>
+                    </a:lnL>
+                    <a:lnR w="12700" cap="flat" cmpd="sng" algn="ctr">
+                      <a:solidFill>
+                        <a:schemeClr val="tx1"/>
+                      </a:solidFill>
+                      <a:prstDash val="solid"/>
+                      <a:round/>
+                      <a:headEnd type="none" w="med" len="med"/>
+                      <a:tailEnd type="none" w="med" len="med"/>
+                    </a:lnR>
+                    <a:lnT w="12700" cap="flat" cmpd="sng" algn="ctr">
+                      <a:solidFill>
+                        <a:schemeClr val="tx1"/>
+                      </a:solidFill>
+                      <a:prstDash val="solid"/>
+                      <a:round/>
+                      <a:headEnd type="none" w="med" len="med"/>
+                      <a:tailEnd type="none" w="med" len="med"/>
+                    </a:lnT>
+                    <a:lnB w="12700" cap="flat" cmpd="sng" algn="ctr">
+                      <a:solidFill>
+                        <a:schemeClr val="tx1"/>
+                      </a:solidFill>
+                      <a:prstDash val="solid"/>
+                      <a:round/>
+                      <a:headEnd type="none" w="med" len="med"/>
+                      <a:tailEnd type="none" w="med" len="med"/>
+                    </a:lnB>
+                    <a:solidFill>
+                      <a:schemeClr val="bg1"/>
+                    </a:solidFill>
+                  </a:tcPr>
+                </a:tc>
+                <a:tc>
+                  <a:txBody>
+                    <a:bodyPr/>
+                    <a:lstStyle/>
+                    <a:p>
+                      <a:pPr algn="ctr"/>
+                      <a:endParaRPr lang="en-US" sz="1400" dirty="0">
+                        <a:solidFill>
+                          <a:schemeClr val="tx1"/>
+                        </a:solidFill>
+                      </a:endParaRPr>
+                    </a:p>
+                  </a:txBody>
+                  <a:tcPr anchor="ctr">
+                    <a:lnL w="12700" cap="flat" cmpd="sng" algn="ctr">
+                      <a:solidFill>
+                        <a:schemeClr val="tx1"/>
+                      </a:solidFill>
+                      <a:prstDash val="solid"/>
+                      <a:round/>
+                      <a:headEnd type="none" w="med" len="med"/>
+                      <a:tailEnd type="none" w="med" len="med"/>
+                    </a:lnL>
+                    <a:lnR w="12700" cap="flat" cmpd="sng" algn="ctr">
+                      <a:solidFill>
+                        <a:schemeClr val="tx1"/>
+                      </a:solidFill>
+                      <a:prstDash val="solid"/>
+                      <a:round/>
+                      <a:headEnd type="none" w="med" len="med"/>
+                      <a:tailEnd type="none" w="med" len="med"/>
+                    </a:lnR>
+                    <a:lnT w="12700" cap="flat" cmpd="sng" algn="ctr">
+                      <a:solidFill>
+                        <a:schemeClr val="tx1"/>
+                      </a:solidFill>
+                      <a:prstDash val="solid"/>
+                      <a:round/>
+                      <a:headEnd type="none" w="med" len="med"/>
+                      <a:tailEnd type="none" w="med" len="med"/>
+                    </a:lnT>
+                    <a:lnB w="12700" cap="flat" cmpd="sng" algn="ctr">
+                      <a:solidFill>
+                        <a:schemeClr val="tx1"/>
+                      </a:solidFill>
+                      <a:prstDash val="solid"/>
+                      <a:round/>
+                      <a:headEnd type="none" w="med" len="med"/>
+                      <a:tailEnd type="none" w="med" len="med"/>
+                    </a:lnB>
+                    <a:solidFill>
+                      <a:schemeClr val="bg1"/>
+                    </a:solidFill>
+                  </a:tcPr>
+                </a:tc>
+                <a:tc>
+                  <a:txBody>
+                    <a:bodyPr/>
+                    <a:lstStyle/>
+                    <a:p>
+                      <a:pPr algn="ctr"/>
+                      <a:endParaRPr lang="en-US" sz="1400" dirty="0">
+                        <a:solidFill>
+                          <a:schemeClr val="tx1"/>
+                        </a:solidFill>
+                      </a:endParaRPr>
+                    </a:p>
+                  </a:txBody>
+                  <a:tcPr anchor="ctr">
+                    <a:lnL w="12700" cap="flat" cmpd="sng" algn="ctr">
+                      <a:solidFill>
+                        <a:schemeClr val="tx1"/>
+                      </a:solidFill>
+                      <a:prstDash val="solid"/>
+                      <a:round/>
+                      <a:headEnd type="none" w="med" len="med"/>
+                      <a:tailEnd type="none" w="med" len="med"/>
+                    </a:lnL>
+                    <a:lnR w="12700" cap="flat" cmpd="sng" algn="ctr">
+                      <a:solidFill>
+                        <a:schemeClr val="tx1"/>
+                      </a:solidFill>
+                      <a:prstDash val="solid"/>
+                      <a:round/>
+                      <a:headEnd type="none" w="med" len="med"/>
+                      <a:tailEnd type="none" w="med" len="med"/>
+                    </a:lnR>
+                    <a:lnT w="12700" cap="flat" cmpd="sng" algn="ctr">
+                      <a:solidFill>
+                        <a:schemeClr val="tx1"/>
+                      </a:solidFill>
+                      <a:prstDash val="solid"/>
+                      <a:round/>
+                      <a:headEnd type="none" w="med" len="med"/>
+                      <a:tailEnd type="none" w="med" len="med"/>
+                    </a:lnT>
+                    <a:lnB w="12700" cap="flat" cmpd="sng" algn="ctr">
+                      <a:solidFill>
+                        <a:schemeClr val="tx1"/>
+                      </a:solidFill>
+                      <a:prstDash val="solid"/>
+                      <a:round/>
+                      <a:headEnd type="none" w="med" len="med"/>
+                      <a:tailEnd type="none" w="med" len="med"/>
+                    </a:lnB>
+                    <a:solidFill>
+                      <a:schemeClr val="tx1">
+                        <a:lumMod val="50000"/>
+                        <a:lumOff val="50000"/>
+                      </a:schemeClr>
+                    </a:solidFill>
+                  </a:tcPr>
+                </a:tc>
+                <a:tc>
+                  <a:txBody>
+                    <a:bodyPr/>
+                    <a:lstStyle/>
+                    <a:p>
+                      <a:pPr algn="ctr"/>
+                      <a:endParaRPr lang="en-US" sz="1400" dirty="0">
+                        <a:solidFill>
+                          <a:schemeClr val="tx1"/>
+                        </a:solidFill>
+                      </a:endParaRPr>
+                    </a:p>
+                  </a:txBody>
+                  <a:tcPr anchor="ctr">
+                    <a:lnL w="12700" cap="flat" cmpd="sng" algn="ctr">
+                      <a:solidFill>
+                        <a:schemeClr val="tx1"/>
+                      </a:solidFill>
+                      <a:prstDash val="solid"/>
+                      <a:round/>
+                      <a:headEnd type="none" w="med" len="med"/>
+                      <a:tailEnd type="none" w="med" len="med"/>
+                    </a:lnL>
+                    <a:lnR w="12700" cap="flat" cmpd="sng" algn="ctr">
+                      <a:solidFill>
+                        <a:schemeClr val="tx1"/>
+                      </a:solidFill>
+                      <a:prstDash val="solid"/>
+                      <a:round/>
+                      <a:headEnd type="none" w="med" len="med"/>
+                      <a:tailEnd type="none" w="med" len="med"/>
+                    </a:lnR>
+                    <a:lnT w="12700" cap="flat" cmpd="sng" algn="ctr">
+                      <a:solidFill>
+                        <a:schemeClr val="tx1"/>
+                      </a:solidFill>
+                      <a:prstDash val="solid"/>
+                      <a:round/>
+                      <a:headEnd type="none" w="med" len="med"/>
+                      <a:tailEnd type="none" w="med" len="med"/>
+                    </a:lnT>
+                    <a:lnB w="12700" cap="flat" cmpd="sng" algn="ctr">
+                      <a:solidFill>
+                        <a:schemeClr val="tx1"/>
+                      </a:solidFill>
+                      <a:prstDash val="solid"/>
+                      <a:round/>
+                      <a:headEnd type="none" w="med" len="med"/>
+                      <a:tailEnd type="none" w="med" len="med"/>
+                    </a:lnB>
+                    <a:solidFill>
+                      <a:schemeClr val="bg1"/>
+                    </a:solidFill>
+                  </a:tcPr>
+                </a:tc>
+              </a:tr>
+              <a:tr h="370840">
+                <a:tc>
+                  <a:txBody>
+                    <a:bodyPr/>
+                    <a:lstStyle/>
+                    <a:p>
+                      <a:pPr algn="l"/>
+                      <a:r>
+                        <a:rPr lang="en-US" sz="1400" dirty="0" smtClean="0">
+                          <a:solidFill>
+                            <a:schemeClr val="tx1"/>
+                          </a:solidFill>
+                        </a:rPr>
+                        <a:t>Combining two programs and writing final report</a:t>
+                      </a:r>
+                      <a:endParaRPr lang="en-US" sz="1400" dirty="0">
+                        <a:solidFill>
+                          <a:schemeClr val="tx1"/>
+                        </a:solidFill>
+                      </a:endParaRPr>
+                    </a:p>
+                  </a:txBody>
+                  <a:tcPr anchor="ctr">
+                    <a:lnL w="12700" cap="flat" cmpd="sng" algn="ctr">
+                      <a:solidFill>
+                        <a:schemeClr val="tx1"/>
+                      </a:solidFill>
+                      <a:prstDash val="solid"/>
+                      <a:round/>
+                      <a:headEnd type="none" w="med" len="med"/>
+                      <a:tailEnd type="none" w="med" len="med"/>
+                    </a:lnL>
+                    <a:lnR w="12700" cap="flat" cmpd="sng" algn="ctr">
+                      <a:solidFill>
+                        <a:schemeClr val="tx1"/>
+                      </a:solidFill>
+                      <a:prstDash val="solid"/>
+                      <a:round/>
+                      <a:headEnd type="none" w="med" len="med"/>
+                      <a:tailEnd type="none" w="med" len="med"/>
+                    </a:lnR>
+                    <a:lnT w="12700" cap="flat" cmpd="sng" algn="ctr">
+                      <a:solidFill>
+                        <a:schemeClr val="tx1"/>
+                      </a:solidFill>
+                      <a:prstDash val="solid"/>
+                      <a:round/>
+                      <a:headEnd type="none" w="med" len="med"/>
+                      <a:tailEnd type="none" w="med" len="med"/>
+                    </a:lnT>
+                    <a:lnB w="12700" cap="flat" cmpd="sng" algn="ctr">
+                      <a:solidFill>
+                        <a:schemeClr val="tx1"/>
+                      </a:solidFill>
+                      <a:prstDash val="solid"/>
+                      <a:round/>
+                      <a:headEnd type="none" w="med" len="med"/>
+                      <a:tailEnd type="none" w="med" len="med"/>
+                    </a:lnB>
+                    <a:solidFill>
+                      <a:schemeClr val="bg1"/>
+                    </a:solidFill>
+                  </a:tcPr>
+                </a:tc>
+                <a:tc>
+                  <a:txBody>
+                    <a:bodyPr/>
+                    <a:lstStyle/>
+                    <a:p>
+                      <a:pPr algn="ctr"/>
+                      <a:endParaRPr lang="en-US" sz="1400" dirty="0">
+                        <a:solidFill>
+                          <a:schemeClr val="tx1"/>
+                        </a:solidFill>
+                      </a:endParaRPr>
+                    </a:p>
+                  </a:txBody>
+                  <a:tcPr anchor="ctr">
+                    <a:lnL w="12700" cap="flat" cmpd="sng" algn="ctr">
+                      <a:solidFill>
+                        <a:schemeClr val="tx1"/>
+                      </a:solidFill>
+                      <a:prstDash val="solid"/>
+                      <a:round/>
+                      <a:headEnd type="none" w="med" len="med"/>
+                      <a:tailEnd type="none" w="med" len="med"/>
+                    </a:lnL>
+                    <a:lnR w="12700" cap="flat" cmpd="sng" algn="ctr">
+                      <a:solidFill>
+                        <a:schemeClr val="tx1"/>
+                      </a:solidFill>
+                      <a:prstDash val="solid"/>
+                      <a:round/>
+                      <a:headEnd type="none" w="med" len="med"/>
+                      <a:tailEnd type="none" w="med" len="med"/>
+                    </a:lnR>
+                    <a:lnT w="12700" cap="flat" cmpd="sng" algn="ctr">
+                      <a:solidFill>
+                        <a:schemeClr val="tx1"/>
+                      </a:solidFill>
+                      <a:prstDash val="solid"/>
+                      <a:round/>
+                      <a:headEnd type="none" w="med" len="med"/>
+                      <a:tailEnd type="none" w="med" len="med"/>
+                    </a:lnT>
+                    <a:lnB w="12700" cap="flat" cmpd="sng" algn="ctr">
+                      <a:solidFill>
+                        <a:schemeClr val="tx1"/>
+                      </a:solidFill>
+                      <a:prstDash val="solid"/>
+                      <a:round/>
+                      <a:headEnd type="none" w="med" len="med"/>
+                      <a:tailEnd type="none" w="med" len="med"/>
+                    </a:lnB>
+                    <a:solidFill>
+                      <a:schemeClr val="bg1"/>
+                    </a:solidFill>
+                  </a:tcPr>
+                </a:tc>
+                <a:tc>
+                  <a:txBody>
+                    <a:bodyPr/>
+                    <a:lstStyle/>
+                    <a:p>
+                      <a:pPr algn="ctr"/>
+                      <a:endParaRPr lang="en-US" sz="1400" dirty="0">
+                        <a:solidFill>
+                          <a:schemeClr val="tx1"/>
+                        </a:solidFill>
+                      </a:endParaRPr>
+                    </a:p>
+                  </a:txBody>
+                  <a:tcPr anchor="ctr">
+                    <a:lnL w="12700" cap="flat" cmpd="sng" algn="ctr">
+                      <a:solidFill>
+                        <a:schemeClr val="tx1"/>
+                      </a:solidFill>
+                      <a:prstDash val="solid"/>
+                      <a:round/>
+                      <a:headEnd type="none" w="med" len="med"/>
+                      <a:tailEnd type="none" w="med" len="med"/>
+                    </a:lnL>
+                    <a:lnR w="12700" cap="flat" cmpd="sng" algn="ctr">
+                      <a:solidFill>
+                        <a:schemeClr val="tx1"/>
+                      </a:solidFill>
+                      <a:prstDash val="solid"/>
+                      <a:round/>
+                      <a:headEnd type="none" w="med" len="med"/>
+                      <a:tailEnd type="none" w="med" len="med"/>
+                    </a:lnR>
+                    <a:lnT w="12700" cap="flat" cmpd="sng" algn="ctr">
+                      <a:solidFill>
+                        <a:schemeClr val="tx1"/>
+                      </a:solidFill>
+                      <a:prstDash val="solid"/>
+                      <a:round/>
+                      <a:headEnd type="none" w="med" len="med"/>
+                      <a:tailEnd type="none" w="med" len="med"/>
+                    </a:lnT>
+                    <a:lnB w="12700" cap="flat" cmpd="sng" algn="ctr">
+                      <a:solidFill>
+                        <a:schemeClr val="tx1"/>
+                      </a:solidFill>
+                      <a:prstDash val="solid"/>
+                      <a:round/>
+                      <a:headEnd type="none" w="med" len="med"/>
+                      <a:tailEnd type="none" w="med" len="med"/>
+                    </a:lnB>
+                    <a:solidFill>
+                      <a:schemeClr val="bg1"/>
+                    </a:solidFill>
+                  </a:tcPr>
+                </a:tc>
+                <a:tc>
+                  <a:txBody>
+                    <a:bodyPr/>
+                    <a:lstStyle/>
+                    <a:p>
+                      <a:pPr algn="ctr"/>
+                      <a:endParaRPr lang="en-US" sz="1400" dirty="0">
+                        <a:solidFill>
+                          <a:schemeClr val="tx1"/>
+                        </a:solidFill>
+                      </a:endParaRPr>
+                    </a:p>
+                  </a:txBody>
+                  <a:tcPr anchor="ctr">
+                    <a:lnL w="12700" cap="flat" cmpd="sng" algn="ctr">
+                      <a:solidFill>
+                        <a:schemeClr val="tx1"/>
+                      </a:solidFill>
+                      <a:prstDash val="solid"/>
+                      <a:round/>
+                      <a:headEnd type="none" w="med" len="med"/>
+                      <a:tailEnd type="none" w="med" len="med"/>
+                    </a:lnL>
+                    <a:lnR w="12700" cap="flat" cmpd="sng" algn="ctr">
+                      <a:solidFill>
+                        <a:schemeClr val="tx1"/>
+                      </a:solidFill>
+                      <a:prstDash val="solid"/>
+                      <a:round/>
+                      <a:headEnd type="none" w="med" len="med"/>
+                      <a:tailEnd type="none" w="med" len="med"/>
+                    </a:lnR>
+                    <a:lnT w="12700" cap="flat" cmpd="sng" algn="ctr">
+                      <a:solidFill>
+                        <a:schemeClr val="tx1"/>
+                      </a:solidFill>
+                      <a:prstDash val="solid"/>
+                      <a:round/>
+                      <a:headEnd type="none" w="med" len="med"/>
+                      <a:tailEnd type="none" w="med" len="med"/>
+                    </a:lnT>
+                    <a:lnB w="12700" cap="flat" cmpd="sng" algn="ctr">
+                      <a:solidFill>
+                        <a:schemeClr val="tx1"/>
+                      </a:solidFill>
+                      <a:prstDash val="solid"/>
+                      <a:round/>
+                      <a:headEnd type="none" w="med" len="med"/>
+                      <a:tailEnd type="none" w="med" len="med"/>
+                    </a:lnB>
+                    <a:solidFill>
+                      <a:schemeClr val="tx1">
+                        <a:lumMod val="50000"/>
+                        <a:lumOff val="50000"/>
+                      </a:schemeClr>
+                    </a:solidFill>
+                  </a:tcPr>
+                </a:tc>
+              </a:tr>
+              <a:tr h="370840">
+                <a:tc>
+                  <a:txBody>
+                    <a:bodyPr/>
+                    <a:lstStyle/>
+                    <a:p>
+                      <a:pPr algn="l"/>
+                      <a:r>
+                        <a:rPr lang="en-US" sz="1400" dirty="0" smtClean="0">
+                          <a:solidFill>
+                            <a:schemeClr val="tx1"/>
+                          </a:solidFill>
+                        </a:rPr>
+                        <a:t>Writing final report</a:t>
+                      </a:r>
+                      <a:endParaRPr lang="en-US" sz="1400" dirty="0">
+                        <a:solidFill>
+                          <a:schemeClr val="tx1"/>
+                        </a:solidFill>
+                      </a:endParaRPr>
+                    </a:p>
+                  </a:txBody>
+                  <a:tcPr anchor="ctr">
+                    <a:lnL w="12700" cap="flat" cmpd="sng" algn="ctr">
+                      <a:solidFill>
+                        <a:schemeClr val="tx1"/>
+                      </a:solidFill>
+                      <a:prstDash val="solid"/>
+                      <a:round/>
+                      <a:headEnd type="none" w="med" len="med"/>
+                      <a:tailEnd type="none" w="med" len="med"/>
+                    </a:lnL>
+                    <a:lnR w="12700" cap="flat" cmpd="sng" algn="ctr">
+                      <a:solidFill>
+                        <a:schemeClr val="tx1"/>
+                      </a:solidFill>
+                      <a:prstDash val="solid"/>
+                      <a:round/>
+                      <a:headEnd type="none" w="med" len="med"/>
+                      <a:tailEnd type="none" w="med" len="med"/>
+                    </a:lnR>
+                    <a:lnT w="12700" cap="flat" cmpd="sng" algn="ctr">
+                      <a:solidFill>
+                        <a:schemeClr val="tx1"/>
+                      </a:solidFill>
+                      <a:prstDash val="solid"/>
+                      <a:round/>
+                      <a:headEnd type="none" w="med" len="med"/>
+                      <a:tailEnd type="none" w="med" len="med"/>
+                    </a:lnT>
+                    <a:lnB w="12700" cap="flat" cmpd="sng" algn="ctr">
+                      <a:solidFill>
+                        <a:schemeClr val="tx1"/>
+                      </a:solidFill>
+                      <a:prstDash val="solid"/>
+                      <a:round/>
+                      <a:headEnd type="none" w="med" len="med"/>
+                      <a:tailEnd type="none" w="med" len="med"/>
+                    </a:lnB>
+                    <a:solidFill>
+                      <a:schemeClr val="bg1"/>
+                    </a:solidFill>
+                  </a:tcPr>
+                </a:tc>
+                <a:tc>
+                  <a:txBody>
+                    <a:bodyPr/>
+                    <a:lstStyle/>
+                    <a:p>
+                      <a:pPr algn="ctr"/>
+                      <a:endParaRPr lang="en-US" sz="1400" dirty="0">
+                        <a:solidFill>
+                          <a:schemeClr val="tx1"/>
+                        </a:solidFill>
+                      </a:endParaRPr>
+                    </a:p>
+                  </a:txBody>
+                  <a:tcPr anchor="ctr">
+                    <a:lnL w="12700" cap="flat" cmpd="sng" algn="ctr">
+                      <a:solidFill>
+                        <a:schemeClr val="tx1"/>
+                      </a:solidFill>
+                      <a:prstDash val="solid"/>
+                      <a:round/>
+                      <a:headEnd type="none" w="med" len="med"/>
+                      <a:tailEnd type="none" w="med" len="med"/>
+                    </a:lnL>
+                    <a:lnR w="12700" cap="flat" cmpd="sng" algn="ctr">
+                      <a:solidFill>
+                        <a:schemeClr val="tx1"/>
+                      </a:solidFill>
+                      <a:prstDash val="solid"/>
+                      <a:round/>
+                      <a:headEnd type="none" w="med" len="med"/>
+                      <a:tailEnd type="none" w="med" len="med"/>
+                    </a:lnR>
+                    <a:lnT w="12700" cap="flat" cmpd="sng" algn="ctr">
+                      <a:solidFill>
+                        <a:schemeClr val="tx1"/>
+                      </a:solidFill>
+                      <a:prstDash val="solid"/>
+                      <a:round/>
+                      <a:headEnd type="none" w="med" len="med"/>
+                      <a:tailEnd type="none" w="med" len="med"/>
+                    </a:lnT>
+                    <a:lnB w="12700" cap="flat" cmpd="sng" algn="ctr">
+                      <a:solidFill>
+                        <a:schemeClr val="tx1"/>
+                      </a:solidFill>
+                      <a:prstDash val="solid"/>
+                      <a:round/>
+                      <a:headEnd type="none" w="med" len="med"/>
+                      <a:tailEnd type="none" w="med" len="med"/>
+                    </a:lnB>
+                    <a:solidFill>
+                      <a:schemeClr val="bg1"/>
+                    </a:solidFill>
+                  </a:tcPr>
+                </a:tc>
+                <a:tc>
+                  <a:txBody>
+                    <a:bodyPr/>
+                    <a:lstStyle/>
+                    <a:p>
+                      <a:pPr algn="ctr"/>
+                      <a:endParaRPr lang="en-US" sz="1400" dirty="0">
+                        <a:solidFill>
+                          <a:schemeClr val="tx1"/>
+                        </a:solidFill>
+                      </a:endParaRPr>
+                    </a:p>
+                  </a:txBody>
+                  <a:tcPr anchor="ctr">
+                    <a:lnL w="12700" cap="flat" cmpd="sng" algn="ctr">
+                      <a:solidFill>
+                        <a:schemeClr val="tx1"/>
+                      </a:solidFill>
+                      <a:prstDash val="solid"/>
+                      <a:round/>
+                      <a:headEnd type="none" w="med" len="med"/>
+                      <a:tailEnd type="none" w="med" len="med"/>
+                    </a:lnL>
+                    <a:lnR w="12700" cap="flat" cmpd="sng" algn="ctr">
+                      <a:solidFill>
+                        <a:schemeClr val="tx1"/>
+                      </a:solidFill>
+                      <a:prstDash val="solid"/>
+                      <a:round/>
+                      <a:headEnd type="none" w="med" len="med"/>
+                      <a:tailEnd type="none" w="med" len="med"/>
+                    </a:lnR>
+                    <a:lnT w="12700" cap="flat" cmpd="sng" algn="ctr">
+                      <a:solidFill>
+                        <a:schemeClr val="tx1"/>
+                      </a:solidFill>
+                      <a:prstDash val="solid"/>
+                      <a:round/>
+                      <a:headEnd type="none" w="med" len="med"/>
+                      <a:tailEnd type="none" w="med" len="med"/>
+                    </a:lnT>
+                    <a:lnB w="12700" cap="flat" cmpd="sng" algn="ctr">
+                      <a:solidFill>
+                        <a:schemeClr val="tx1"/>
+                      </a:solidFill>
+                      <a:prstDash val="solid"/>
+                      <a:round/>
+                      <a:headEnd type="none" w="med" len="med"/>
+                      <a:tailEnd type="none" w="med" len="med"/>
+                    </a:lnB>
+                    <a:solidFill>
+                      <a:schemeClr val="bg1"/>
+                    </a:solidFill>
+                  </a:tcPr>
+                </a:tc>
+                <a:tc>
+                  <a:txBody>
+                    <a:bodyPr/>
+                    <a:lstStyle/>
+                    <a:p>
+                      <a:pPr algn="ctr"/>
+                      <a:endParaRPr lang="en-US" sz="1400" dirty="0">
+                        <a:solidFill>
+                          <a:schemeClr val="tx1"/>
+                        </a:solidFill>
+                      </a:endParaRPr>
+                    </a:p>
+                  </a:txBody>
+                  <a:tcPr anchor="ctr">
+                    <a:lnL w="12700" cap="flat" cmpd="sng" algn="ctr">
+                      <a:solidFill>
+                        <a:schemeClr val="tx1"/>
+                      </a:solidFill>
+                      <a:prstDash val="solid"/>
+                      <a:round/>
+                      <a:headEnd type="none" w="med" len="med"/>
+                      <a:tailEnd type="none" w="med" len="med"/>
+                    </a:lnL>
+                    <a:lnR w="12700" cap="flat" cmpd="sng" algn="ctr">
+                      <a:solidFill>
+                        <a:schemeClr val="tx1"/>
+                      </a:solidFill>
+                      <a:prstDash val="solid"/>
+                      <a:round/>
+                      <a:headEnd type="none" w="med" len="med"/>
+                      <a:tailEnd type="none" w="med" len="med"/>
+                    </a:lnR>
+                    <a:lnT w="12700" cap="flat" cmpd="sng" algn="ctr">
+                      <a:solidFill>
+                        <a:schemeClr val="tx1"/>
+                      </a:solidFill>
+                      <a:prstDash val="solid"/>
+                      <a:round/>
+                      <a:headEnd type="none" w="med" len="med"/>
+                      <a:tailEnd type="none" w="med" len="med"/>
+                    </a:lnT>
+                    <a:lnB w="12700" cap="flat" cmpd="sng" algn="ctr">
+                      <a:solidFill>
+                        <a:schemeClr val="tx1"/>
+                      </a:solidFill>
+                      <a:prstDash val="solid"/>
+                      <a:round/>
+                      <a:headEnd type="none" w="med" len="med"/>
+                      <a:tailEnd type="none" w="med" len="med"/>
+                    </a:lnB>
+                    <a:solidFill>
+                      <a:schemeClr val="tx1">
+                        <a:lumMod val="50000"/>
+                        <a:lumOff val="50000"/>
+                      </a:schemeClr>
+                    </a:solidFill>
+                  </a:tcPr>
+                </a:tc>
+              </a:tr>
+            </a:tbl>
+          </a:graphicData>
+        </a:graphic>
+      </p:graphicFrame>
+    </p:spTree>
+    <p:extLst>
+      <p:ext uri="{BB962C8B-B14F-4D97-AF65-F5344CB8AC3E}">
+        <p14:creationId xmlns:p14="http://schemas.microsoft.com/office/powerpoint/2010/main" val="2199332720"/>
+      </p:ext>
+    </p:extLst>
+  </p:cSld>
+  <p:clrMapOvr>
+    <a:masterClrMapping/>
+  </p:clrMapOvr>
+  <p:timing>
+    <p:tnLst>
+      <p:par>
+        <p:cTn id="1" dur="indefinite" restart="never" nodeType="tmRoot"/>
+      </p:par>
+    </p:tnLst>
+  </p:timing>
+</p:sld>
+</file>
+
 <file path=ppt/slides/slide2.xml><?xml version="1.0" encoding="utf-8"?>
 <p:sld xmlns:a="http://schemas.openxmlformats.org/drawingml/2006/main" xmlns:r="http://schemas.openxmlformats.org/officeDocument/2006/relationships" xmlns:p="http://schemas.openxmlformats.org/presentationml/2006/main">
   <p:cSld>
@@ -4314,6 +6205,801 @@
           <a:lstStyle/>
           <a:p>
             <a:r>
+              <a:rPr lang="en-US" dirty="0" smtClean="0"/>
+              <a:t>Technical Challenges</a:t>
+            </a:r>
+            <a:endParaRPr lang="en-US" dirty="0"/>
+          </a:p>
+        </p:txBody>
+      </p:sp>
+      <p:sp>
+        <p:nvSpPr>
+          <p:cNvPr id="3" name="Content Placeholder 2"/>
+          <p:cNvSpPr>
+            <a:spLocks noGrp="1"/>
+          </p:cNvSpPr>
+          <p:nvPr>
+            <p:ph idx="1"/>
+          </p:nvPr>
+        </p:nvSpPr>
+        <p:spPr>
+          <a:xfrm>
+            <a:off x="1261872" y="1828800"/>
+            <a:ext cx="5908485" cy="4351337"/>
+          </a:xfrm>
+        </p:spPr>
+        <p:txBody>
+          <a:bodyPr>
+            <a:normAutofit/>
+          </a:bodyPr>
+          <a:lstStyle/>
+          <a:p>
+            <a:r>
+              <a:rPr lang="en-US" dirty="0" smtClean="0"/>
+              <a:t>Accuracy</a:t>
+            </a:r>
+          </a:p>
+          <a:p>
+            <a:endParaRPr lang="en-US" dirty="0" smtClean="0"/>
+          </a:p>
+          <a:p>
+            <a:endParaRPr lang="en-US" dirty="0"/>
+          </a:p>
+          <a:p>
+            <a:endParaRPr lang="en-US" dirty="0" smtClean="0"/>
+          </a:p>
+          <a:p>
+            <a:r>
+              <a:rPr lang="en-US" dirty="0" smtClean="0"/>
+              <a:t>Individual differences between eyes and conditions</a:t>
+            </a:r>
+          </a:p>
+          <a:p>
+            <a:pPr lvl="1"/>
+            <a:r>
+              <a:rPr lang="en-US" dirty="0" smtClean="0"/>
+              <a:t>What works for one set does not always transfer</a:t>
+            </a:r>
+          </a:p>
+          <a:p>
+            <a:pPr lvl="1"/>
+            <a:r>
+              <a:rPr lang="en-US" dirty="0"/>
+              <a:t>Account for rapid, random eye </a:t>
+            </a:r>
+            <a:r>
+              <a:rPr lang="en-US" dirty="0" smtClean="0"/>
+              <a:t>movements</a:t>
+            </a:r>
+            <a:endParaRPr lang="en-US" dirty="0"/>
+          </a:p>
+        </p:txBody>
+      </p:sp>
+      <p:pic>
+        <p:nvPicPr>
+          <p:cNvPr id="4" name="Picture 3"/>
+          <p:cNvPicPr>
+            <a:picLocks noChangeAspect="1"/>
+          </p:cNvPicPr>
+          <p:nvPr/>
+        </p:nvPicPr>
+        <p:blipFill>
+          <a:blip r:embed="rId2">
+            <a:extLst>
+              <a:ext uri="{28A0092B-C50C-407E-A947-70E740481C1C}">
+                <a14:useLocalDpi xmlns:a14="http://schemas.microsoft.com/office/drawing/2010/main" val="0"/>
+              </a:ext>
+            </a:extLst>
+          </a:blip>
+          <a:stretch>
+            <a:fillRect/>
+          </a:stretch>
+        </p:blipFill>
+        <p:spPr>
+          <a:xfrm>
+            <a:off x="6748845" y="1691322"/>
+            <a:ext cx="4205667" cy="1777790"/>
+          </a:xfrm>
+          <a:prstGeom prst="rect">
+            <a:avLst/>
+          </a:prstGeom>
+        </p:spPr>
+      </p:pic>
+      <p:pic>
+        <p:nvPicPr>
+          <p:cNvPr id="5" name="Picture 4"/>
+          <p:cNvPicPr>
+            <a:picLocks noChangeAspect="1"/>
+          </p:cNvPicPr>
+          <p:nvPr/>
+        </p:nvPicPr>
+        <p:blipFill>
+          <a:blip r:embed="rId3" cstate="print">
+            <a:extLst>
+              <a:ext uri="{28A0092B-C50C-407E-A947-70E740481C1C}">
+                <a14:useLocalDpi xmlns:a14="http://schemas.microsoft.com/office/drawing/2010/main" val="0"/>
+              </a:ext>
+            </a:extLst>
+          </a:blip>
+          <a:stretch>
+            <a:fillRect/>
+          </a:stretch>
+        </p:blipFill>
+        <p:spPr>
+          <a:xfrm>
+            <a:off x="1666630" y="4738362"/>
+            <a:ext cx="2001758" cy="1901670"/>
+          </a:xfrm>
+          <a:prstGeom prst="rect">
+            <a:avLst/>
+          </a:prstGeom>
+        </p:spPr>
+      </p:pic>
+      <p:pic>
+        <p:nvPicPr>
+          <p:cNvPr id="7" name="Picture 6"/>
+          <p:cNvPicPr>
+            <a:picLocks noChangeAspect="1"/>
+          </p:cNvPicPr>
+          <p:nvPr/>
+        </p:nvPicPr>
+        <p:blipFill>
+          <a:blip r:embed="rId4" cstate="print">
+            <a:extLst>
+              <a:ext uri="{28A0092B-C50C-407E-A947-70E740481C1C}">
+                <a14:useLocalDpi xmlns:a14="http://schemas.microsoft.com/office/drawing/2010/main" val="0"/>
+              </a:ext>
+            </a:extLst>
+          </a:blip>
+          <a:stretch>
+            <a:fillRect/>
+          </a:stretch>
+        </p:blipFill>
+        <p:spPr>
+          <a:xfrm>
+            <a:off x="7687342" y="4736201"/>
+            <a:ext cx="2328672" cy="1746504"/>
+          </a:xfrm>
+          <a:prstGeom prst="rect">
+            <a:avLst/>
+          </a:prstGeom>
+        </p:spPr>
+      </p:pic>
+      <p:pic>
+        <p:nvPicPr>
+          <p:cNvPr id="8" name="Picture 7"/>
+          <p:cNvPicPr>
+            <a:picLocks noChangeAspect="1"/>
+          </p:cNvPicPr>
+          <p:nvPr/>
+        </p:nvPicPr>
+        <p:blipFill>
+          <a:blip r:embed="rId5" cstate="print">
+            <a:extLst>
+              <a:ext uri="{28A0092B-C50C-407E-A947-70E740481C1C}">
+                <a14:useLocalDpi xmlns:a14="http://schemas.microsoft.com/office/drawing/2010/main" val="0"/>
+              </a:ext>
+            </a:extLst>
+          </a:blip>
+          <a:stretch>
+            <a:fillRect/>
+          </a:stretch>
+        </p:blipFill>
+        <p:spPr>
+          <a:xfrm>
+            <a:off x="4073145" y="4818106"/>
+            <a:ext cx="3097212" cy="1742182"/>
+          </a:xfrm>
+          <a:prstGeom prst="rect">
+            <a:avLst/>
+          </a:prstGeom>
+        </p:spPr>
+      </p:pic>
+    </p:spTree>
+    <p:extLst>
+      <p:ext uri="{BB962C8B-B14F-4D97-AF65-F5344CB8AC3E}">
+        <p14:creationId xmlns:p14="http://schemas.microsoft.com/office/powerpoint/2010/main" val="840450321"/>
+      </p:ext>
+    </p:extLst>
+  </p:cSld>
+  <p:clrMapOvr>
+    <a:masterClrMapping/>
+  </p:clrMapOvr>
+  <p:timing>
+    <p:tnLst>
+      <p:par>
+        <p:cTn id="1" dur="indefinite" restart="never" nodeType="tmRoot"/>
+      </p:par>
+    </p:tnLst>
+  </p:timing>
+</p:sld>
+</file>
+
+<file path=ppt/slides/slide5.xml><?xml version="1.0" encoding="utf-8"?>
+<p:sld xmlns:a="http://schemas.openxmlformats.org/drawingml/2006/main" xmlns:r="http://schemas.openxmlformats.org/officeDocument/2006/relationships" xmlns:p="http://schemas.openxmlformats.org/presentationml/2006/main">
+  <p:cSld>
+    <p:spTree>
+      <p:nvGrpSpPr>
+        <p:cNvPr id="1" name=""/>
+        <p:cNvGrpSpPr/>
+        <p:nvPr/>
+      </p:nvGrpSpPr>
+      <p:grpSpPr>
+        <a:xfrm>
+          <a:off x="0" y="0"/>
+          <a:ext cx="0" cy="0"/>
+          <a:chOff x="0" y="0"/>
+          <a:chExt cx="0" cy="0"/>
+        </a:xfrm>
+      </p:grpSpPr>
+      <p:sp>
+        <p:nvSpPr>
+          <p:cNvPr id="2" name="Title 1"/>
+          <p:cNvSpPr>
+            <a:spLocks noGrp="1"/>
+          </p:cNvSpPr>
+          <p:nvPr>
+            <p:ph type="title"/>
+          </p:nvPr>
+        </p:nvSpPr>
+        <p:spPr/>
+        <p:txBody>
+          <a:bodyPr/>
+          <a:lstStyle/>
+          <a:p>
+            <a:r>
+              <a:rPr lang="en-US" smtClean="0"/>
+              <a:t>Technical Challenges</a:t>
+            </a:r>
+            <a:endParaRPr lang="en-US"/>
+          </a:p>
+        </p:txBody>
+      </p:sp>
+      <p:sp>
+        <p:nvSpPr>
+          <p:cNvPr id="3" name="Content Placeholder 2"/>
+          <p:cNvSpPr>
+            <a:spLocks noGrp="1"/>
+          </p:cNvSpPr>
+          <p:nvPr>
+            <p:ph idx="1"/>
+          </p:nvPr>
+        </p:nvSpPr>
+        <p:spPr>
+          <a:xfrm>
+            <a:off x="1261872" y="1828800"/>
+            <a:ext cx="5893840" cy="4351337"/>
+          </a:xfrm>
+        </p:spPr>
+        <p:txBody>
+          <a:bodyPr>
+            <a:normAutofit/>
+          </a:bodyPr>
+          <a:lstStyle/>
+          <a:p>
+            <a:r>
+              <a:rPr lang="en-US" dirty="0" smtClean="0"/>
+              <a:t>Degree of coverage</a:t>
+            </a:r>
+          </a:p>
+          <a:p>
+            <a:endParaRPr lang="en-US" dirty="0" smtClean="0"/>
+          </a:p>
+          <a:p>
+            <a:endParaRPr lang="en-US" dirty="0" smtClean="0"/>
+          </a:p>
+          <a:p>
+            <a:endParaRPr lang="en-US" dirty="0" smtClean="0"/>
+          </a:p>
+          <a:p>
+            <a:r>
+              <a:rPr lang="en-US" dirty="0" smtClean="0"/>
+              <a:t>Constant connection between eye and sensors</a:t>
+            </a:r>
+          </a:p>
+          <a:p>
+            <a:pPr lvl="1"/>
+            <a:r>
+              <a:rPr lang="en-US" dirty="0"/>
+              <a:t>Dealing with dynamic positioning of user</a:t>
+            </a:r>
+          </a:p>
+          <a:p>
+            <a:pPr lvl="1"/>
+            <a:endParaRPr lang="en-US" dirty="0" smtClean="0"/>
+          </a:p>
+        </p:txBody>
+      </p:sp>
+      <p:pic>
+        <p:nvPicPr>
+          <p:cNvPr id="4" name="Picture 3"/>
+          <p:cNvPicPr>
+            <a:picLocks noChangeAspect="1"/>
+          </p:cNvPicPr>
+          <p:nvPr/>
+        </p:nvPicPr>
+        <p:blipFill>
+          <a:blip r:embed="rId2">
+            <a:extLst>
+              <a:ext uri="{28A0092B-C50C-407E-A947-70E740481C1C}">
+                <a14:useLocalDpi xmlns:a14="http://schemas.microsoft.com/office/drawing/2010/main" val="0"/>
+              </a:ext>
+            </a:extLst>
+          </a:blip>
+          <a:stretch>
+            <a:fillRect/>
+          </a:stretch>
+        </p:blipFill>
+        <p:spPr>
+          <a:xfrm>
+            <a:off x="7155712" y="1691322"/>
+            <a:ext cx="3143707" cy="1746504"/>
+          </a:xfrm>
+          <a:prstGeom prst="rect">
+            <a:avLst/>
+          </a:prstGeom>
+        </p:spPr>
+      </p:pic>
+      <p:pic>
+        <p:nvPicPr>
+          <p:cNvPr id="5" name="Picture 4"/>
+          <p:cNvPicPr>
+            <a:picLocks noChangeAspect="1"/>
+          </p:cNvPicPr>
+          <p:nvPr/>
+        </p:nvPicPr>
+        <p:blipFill>
+          <a:blip r:embed="rId3">
+            <a:extLst>
+              <a:ext uri="{28A0092B-C50C-407E-A947-70E740481C1C}">
+                <a14:useLocalDpi xmlns:a14="http://schemas.microsoft.com/office/drawing/2010/main" val="0"/>
+              </a:ext>
+            </a:extLst>
+          </a:blip>
+          <a:stretch>
+            <a:fillRect/>
+          </a:stretch>
+        </p:blipFill>
+        <p:spPr>
+          <a:xfrm>
+            <a:off x="6730408" y="4569690"/>
+            <a:ext cx="4069011" cy="1490867"/>
+          </a:xfrm>
+          <a:prstGeom prst="rect">
+            <a:avLst/>
+          </a:prstGeom>
+        </p:spPr>
+      </p:pic>
+    </p:spTree>
+    <p:extLst>
+      <p:ext uri="{BB962C8B-B14F-4D97-AF65-F5344CB8AC3E}">
+        <p14:creationId xmlns:p14="http://schemas.microsoft.com/office/powerpoint/2010/main" val="223375222"/>
+      </p:ext>
+    </p:extLst>
+  </p:cSld>
+  <p:clrMapOvr>
+    <a:masterClrMapping/>
+  </p:clrMapOvr>
+  <p:timing>
+    <p:tnLst>
+      <p:par>
+        <p:cTn id="1" dur="indefinite" restart="never" nodeType="tmRoot"/>
+      </p:par>
+    </p:tnLst>
+  </p:timing>
+</p:sld>
+</file>
+
+<file path=ppt/slides/slide6.xml><?xml version="1.0" encoding="utf-8"?>
+<p:sld xmlns:a="http://schemas.openxmlformats.org/drawingml/2006/main" xmlns:r="http://schemas.openxmlformats.org/officeDocument/2006/relationships" xmlns:p="http://schemas.openxmlformats.org/presentationml/2006/main">
+  <p:cSld>
+    <p:spTree>
+      <p:nvGrpSpPr>
+        <p:cNvPr id="1" name=""/>
+        <p:cNvGrpSpPr/>
+        <p:nvPr/>
+      </p:nvGrpSpPr>
+      <p:grpSpPr>
+        <a:xfrm>
+          <a:off x="0" y="0"/>
+          <a:ext cx="0" cy="0"/>
+          <a:chOff x="0" y="0"/>
+          <a:chExt cx="0" cy="0"/>
+        </a:xfrm>
+      </p:grpSpPr>
+      <p:sp>
+        <p:nvSpPr>
+          <p:cNvPr id="2" name="Title 1"/>
+          <p:cNvSpPr>
+            <a:spLocks noGrp="1"/>
+          </p:cNvSpPr>
+          <p:nvPr>
+            <p:ph type="title"/>
+          </p:nvPr>
+        </p:nvSpPr>
+        <p:spPr/>
+        <p:txBody>
+          <a:bodyPr/>
+          <a:lstStyle/>
+          <a:p>
+            <a:r>
+              <a:rPr lang="en-US" dirty="0" smtClean="0"/>
+              <a:t>Technical Challenges</a:t>
+            </a:r>
+            <a:endParaRPr lang="en-US" dirty="0"/>
+          </a:p>
+        </p:txBody>
+      </p:sp>
+      <p:sp>
+        <p:nvSpPr>
+          <p:cNvPr id="3" name="Content Placeholder 2"/>
+          <p:cNvSpPr>
+            <a:spLocks noGrp="1"/>
+          </p:cNvSpPr>
+          <p:nvPr>
+            <p:ph idx="1"/>
+          </p:nvPr>
+        </p:nvSpPr>
+        <p:spPr>
+          <a:xfrm>
+            <a:off x="1261872" y="1828801"/>
+            <a:ext cx="8595360" cy="2849526"/>
+          </a:xfrm>
+        </p:spPr>
+        <p:txBody>
+          <a:bodyPr>
+            <a:normAutofit/>
+          </a:bodyPr>
+          <a:lstStyle/>
+          <a:p>
+            <a:r>
+              <a:rPr lang="en-US" dirty="0" smtClean="0"/>
+              <a:t>Ease of setup / portability</a:t>
+            </a:r>
+          </a:p>
+          <a:p>
+            <a:pPr lvl="1"/>
+            <a:r>
+              <a:rPr lang="en-US" dirty="0" smtClean="0"/>
+              <a:t>Hidden mounting requirement</a:t>
+            </a:r>
+          </a:p>
+          <a:p>
+            <a:endParaRPr lang="en-US" dirty="0" smtClean="0"/>
+          </a:p>
+          <a:p>
+            <a:endParaRPr lang="en-US" dirty="0"/>
+          </a:p>
+          <a:p>
+            <a:endParaRPr lang="en-US" dirty="0" smtClean="0"/>
+          </a:p>
+          <a:p>
+            <a:r>
+              <a:rPr lang="en-US" dirty="0" smtClean="0"/>
+              <a:t>Write our own software to obtain data from eye tracker and detect text and object</a:t>
+            </a:r>
+          </a:p>
+        </p:txBody>
+      </p:sp>
+      <p:pic>
+        <p:nvPicPr>
+          <p:cNvPr id="4" name="Picture 3"/>
+          <p:cNvPicPr>
+            <a:picLocks noChangeAspect="1"/>
+          </p:cNvPicPr>
+          <p:nvPr/>
+        </p:nvPicPr>
+        <p:blipFill>
+          <a:blip r:embed="rId2" cstate="print">
+            <a:extLst>
+              <a:ext uri="{28A0092B-C50C-407E-A947-70E740481C1C}">
+                <a14:useLocalDpi xmlns:a14="http://schemas.microsoft.com/office/drawing/2010/main" val="0"/>
+              </a:ext>
+            </a:extLst>
+          </a:blip>
+          <a:stretch>
+            <a:fillRect/>
+          </a:stretch>
+        </p:blipFill>
+        <p:spPr>
+          <a:xfrm>
+            <a:off x="7459095" y="1828800"/>
+            <a:ext cx="2870790" cy="1913860"/>
+          </a:xfrm>
+          <a:prstGeom prst="rect">
+            <a:avLst/>
+          </a:prstGeom>
+        </p:spPr>
+      </p:pic>
+      <p:sp>
+        <p:nvSpPr>
+          <p:cNvPr id="5" name="TextBox 4"/>
+          <p:cNvSpPr txBox="1"/>
+          <p:nvPr/>
+        </p:nvSpPr>
+        <p:spPr>
+          <a:xfrm>
+            <a:off x="1261873" y="4968167"/>
+            <a:ext cx="1438798" cy="646331"/>
+          </a:xfrm>
+          <a:prstGeom prst="rect">
+            <a:avLst/>
+          </a:prstGeom>
+          <a:noFill/>
+        </p:spPr>
+        <p:txBody>
+          <a:bodyPr wrap="square" rtlCol="0">
+            <a:spAutoFit/>
+          </a:bodyPr>
+          <a:lstStyle/>
+          <a:p>
+            <a:r>
+              <a:rPr lang="en-US" dirty="0" smtClean="0"/>
+              <a:t>Eye tracker sensor</a:t>
+            </a:r>
+            <a:endParaRPr lang="en-US" dirty="0"/>
+          </a:p>
+        </p:txBody>
+      </p:sp>
+      <p:sp>
+        <p:nvSpPr>
+          <p:cNvPr id="6" name="Right Arrow 5"/>
+          <p:cNvSpPr/>
+          <p:nvPr/>
+        </p:nvSpPr>
+        <p:spPr>
+          <a:xfrm>
+            <a:off x="2700670" y="5107218"/>
+            <a:ext cx="2300653" cy="368227"/>
+          </a:xfrm>
+          <a:prstGeom prst="rightArrow">
+            <a:avLst/>
+          </a:prstGeom>
+          <a:solidFill>
+            <a:srgbClr val="FF0000"/>
+          </a:solidFill>
+        </p:spPr>
+        <p:style>
+          <a:lnRef idx="2">
+            <a:schemeClr val="accent1">
+              <a:shade val="50000"/>
+            </a:schemeClr>
+          </a:lnRef>
+          <a:fillRef idx="1">
+            <a:schemeClr val="accent1"/>
+          </a:fillRef>
+          <a:effectRef idx="0">
+            <a:schemeClr val="accent1"/>
+          </a:effectRef>
+          <a:fontRef idx="minor">
+            <a:schemeClr val="lt1"/>
+          </a:fontRef>
+        </p:style>
+        <p:txBody>
+          <a:bodyPr rtlCol="0" anchor="ctr"/>
+          <a:lstStyle/>
+          <a:p>
+            <a:pPr algn="ctr"/>
+            <a:endParaRPr lang="en-US"/>
+          </a:p>
+        </p:txBody>
+      </p:sp>
+      <p:sp>
+        <p:nvSpPr>
+          <p:cNvPr id="9" name="TextBox 8"/>
+          <p:cNvSpPr txBox="1"/>
+          <p:nvPr/>
+        </p:nvSpPr>
+        <p:spPr>
+          <a:xfrm>
+            <a:off x="5158877" y="4968167"/>
+            <a:ext cx="1126900" cy="646331"/>
+          </a:xfrm>
+          <a:prstGeom prst="rect">
+            <a:avLst/>
+          </a:prstGeom>
+          <a:noFill/>
+        </p:spPr>
+        <p:txBody>
+          <a:bodyPr wrap="square" rtlCol="0">
+            <a:spAutoFit/>
+          </a:bodyPr>
+          <a:lstStyle/>
+          <a:p>
+            <a:r>
+              <a:rPr lang="en-US" dirty="0" smtClean="0"/>
+              <a:t>Target Location</a:t>
+            </a:r>
+            <a:endParaRPr lang="en-US" dirty="0"/>
+          </a:p>
+        </p:txBody>
+      </p:sp>
+      <p:sp>
+        <p:nvSpPr>
+          <p:cNvPr id="11" name="Right Arrow 10"/>
+          <p:cNvSpPr/>
+          <p:nvPr/>
+        </p:nvSpPr>
+        <p:spPr>
+          <a:xfrm>
+            <a:off x="6443329" y="5153291"/>
+            <a:ext cx="2300653" cy="368227"/>
+          </a:xfrm>
+          <a:prstGeom prst="rightArrow">
+            <a:avLst/>
+          </a:prstGeom>
+          <a:solidFill>
+            <a:srgbClr val="FF0000"/>
+          </a:solidFill>
+        </p:spPr>
+        <p:style>
+          <a:lnRef idx="2">
+            <a:schemeClr val="accent1">
+              <a:shade val="50000"/>
+            </a:schemeClr>
+          </a:lnRef>
+          <a:fillRef idx="1">
+            <a:schemeClr val="accent1"/>
+          </a:fillRef>
+          <a:effectRef idx="0">
+            <a:schemeClr val="accent1"/>
+          </a:effectRef>
+          <a:fontRef idx="minor">
+            <a:schemeClr val="lt1"/>
+          </a:fontRef>
+        </p:style>
+        <p:txBody>
+          <a:bodyPr rtlCol="0" anchor="ctr"/>
+          <a:lstStyle/>
+          <a:p>
+            <a:pPr algn="ctr"/>
+            <a:endParaRPr lang="en-US"/>
+          </a:p>
+        </p:txBody>
+      </p:sp>
+      <p:sp>
+        <p:nvSpPr>
+          <p:cNvPr id="12" name="TextBox 11"/>
+          <p:cNvSpPr txBox="1"/>
+          <p:nvPr/>
+        </p:nvSpPr>
+        <p:spPr>
+          <a:xfrm>
+            <a:off x="8894490" y="5014238"/>
+            <a:ext cx="1229667" cy="646331"/>
+          </a:xfrm>
+          <a:prstGeom prst="rect">
+            <a:avLst/>
+          </a:prstGeom>
+          <a:noFill/>
+        </p:spPr>
+        <p:txBody>
+          <a:bodyPr wrap="square" rtlCol="0">
+            <a:spAutoFit/>
+          </a:bodyPr>
+          <a:lstStyle/>
+          <a:p>
+            <a:r>
+              <a:rPr lang="en-US" dirty="0" smtClean="0"/>
+              <a:t>Detection object</a:t>
+            </a:r>
+            <a:endParaRPr lang="en-US" dirty="0"/>
+          </a:p>
+        </p:txBody>
+      </p:sp>
+      <p:sp>
+        <p:nvSpPr>
+          <p:cNvPr id="13" name="TextBox 12"/>
+          <p:cNvSpPr txBox="1"/>
+          <p:nvPr/>
+        </p:nvSpPr>
+        <p:spPr>
+          <a:xfrm>
+            <a:off x="2700671" y="4699591"/>
+            <a:ext cx="2300652" cy="369332"/>
+          </a:xfrm>
+          <a:prstGeom prst="rect">
+            <a:avLst/>
+          </a:prstGeom>
+          <a:noFill/>
+        </p:spPr>
+        <p:txBody>
+          <a:bodyPr wrap="square" rtlCol="0">
+            <a:spAutoFit/>
+          </a:bodyPr>
+          <a:lstStyle/>
+          <a:p>
+            <a:r>
+              <a:rPr lang="en-US" dirty="0" smtClean="0"/>
+              <a:t>Eye track Software</a:t>
+            </a:r>
+            <a:endParaRPr lang="en-US" dirty="0"/>
+          </a:p>
+        </p:txBody>
+      </p:sp>
+      <p:sp>
+        <p:nvSpPr>
+          <p:cNvPr id="14" name="TextBox 13"/>
+          <p:cNvSpPr txBox="1"/>
+          <p:nvPr/>
+        </p:nvSpPr>
+        <p:spPr>
+          <a:xfrm>
+            <a:off x="6425623" y="4554276"/>
+            <a:ext cx="2590786" cy="646331"/>
+          </a:xfrm>
+          <a:prstGeom prst="rect">
+            <a:avLst/>
+          </a:prstGeom>
+          <a:noFill/>
+        </p:spPr>
+        <p:txBody>
+          <a:bodyPr wrap="square" rtlCol="0">
+            <a:spAutoFit/>
+          </a:bodyPr>
+          <a:lstStyle/>
+          <a:p>
+            <a:r>
+              <a:rPr lang="en-US" dirty="0" smtClean="0"/>
+              <a:t>Object detection Software</a:t>
+            </a:r>
+            <a:endParaRPr lang="en-US" dirty="0"/>
+          </a:p>
+        </p:txBody>
+      </p:sp>
+    </p:spTree>
+    <p:extLst>
+      <p:ext uri="{BB962C8B-B14F-4D97-AF65-F5344CB8AC3E}">
+        <p14:creationId xmlns:p14="http://schemas.microsoft.com/office/powerpoint/2010/main" val="3842292263"/>
+      </p:ext>
+    </p:extLst>
+  </p:cSld>
+  <p:clrMapOvr>
+    <a:masterClrMapping/>
+  </p:clrMapOvr>
+  <p:timing>
+    <p:tnLst>
+      <p:par>
+        <p:cTn id="1" dur="indefinite" restart="never" nodeType="tmRoot"/>
+      </p:par>
+    </p:tnLst>
+  </p:timing>
+</p:sld>
+</file>
+
+<file path=ppt/slides/slide7.xml><?xml version="1.0" encoding="utf-8"?>
+<p:sld xmlns:a="http://schemas.openxmlformats.org/drawingml/2006/main" xmlns:r="http://schemas.openxmlformats.org/officeDocument/2006/relationships" xmlns:p="http://schemas.openxmlformats.org/presentationml/2006/main">
+  <p:cSld>
+    <p:spTree>
+      <p:nvGrpSpPr>
+        <p:cNvPr id="1" name=""/>
+        <p:cNvGrpSpPr/>
+        <p:nvPr/>
+      </p:nvGrpSpPr>
+      <p:grpSpPr>
+        <a:xfrm>
+          <a:off x="0" y="0"/>
+          <a:ext cx="0" cy="0"/>
+          <a:chOff x="0" y="0"/>
+          <a:chExt cx="0" cy="0"/>
+        </a:xfrm>
+      </p:grpSpPr>
+      <p:sp>
+        <p:nvSpPr>
+          <p:cNvPr id="2" name="Title 1"/>
+          <p:cNvSpPr>
+            <a:spLocks noGrp="1"/>
+          </p:cNvSpPr>
+          <p:nvPr>
+            <p:ph type="title"/>
+          </p:nvPr>
+        </p:nvSpPr>
+        <p:spPr/>
+        <p:txBody>
+          <a:bodyPr/>
+          <a:lstStyle/>
+          <a:p>
+            <a:r>
               <a:rPr lang="en-US" smtClean="0"/>
               <a:t>Approach</a:t>
             </a:r>
@@ -4381,7 +7067,6 @@
               <a:rPr lang="en-US" dirty="0" smtClean="0"/>
               <a:t>Calibration period difficult (unclear of what changes to calibration allowed for greater success)</a:t>
             </a:r>
-            <a:endParaRPr lang="en-US" dirty="0" smtClean="0"/>
           </a:p>
           <a:p>
             <a:r>
@@ -4509,7 +7194,7 @@
 </p:sld>
 </file>
 
-<file path=ppt/slides/slide5.xml><?xml version="1.0" encoding="utf-8"?>
+<file path=ppt/slides/slide8.xml><?xml version="1.0" encoding="utf-8"?>
 <p:sld xmlns:a="http://schemas.openxmlformats.org/drawingml/2006/main" xmlns:r="http://schemas.openxmlformats.org/officeDocument/2006/relationships" xmlns:p="http://schemas.openxmlformats.org/presentationml/2006/main">
   <p:cSld>
     <p:spTree>
@@ -4536,16 +7221,21 @@
             <p:ph type="title"/>
           </p:nvPr>
         </p:nvSpPr>
-        <p:spPr/>
+        <p:spPr>
+          <a:xfrm>
+            <a:off x="1261872" y="-204084"/>
+            <a:ext cx="9692640" cy="1325562"/>
+          </a:xfrm>
+        </p:spPr>
         <p:txBody>
           <a:bodyPr/>
           <a:lstStyle/>
           <a:p>
             <a:r>
-              <a:rPr lang="en-US" smtClean="0"/>
-              <a:t>Experiments</a:t>
-            </a:r>
-            <a:endParaRPr lang="en-US"/>
+              <a:rPr lang="en-US" dirty="0" smtClean="0"/>
+              <a:t>Experiment 1</a:t>
+            </a:r>
+            <a:endParaRPr lang="en-US" dirty="0"/>
           </a:p>
         </p:txBody>
       </p:sp>
@@ -4559,66 +7249,82 @@
             <p:ph idx="1"/>
           </p:nvPr>
         </p:nvSpPr>
-        <p:spPr/>
+        <p:spPr>
+          <a:xfrm>
+            <a:off x="1261872" y="1121478"/>
+            <a:ext cx="8595360" cy="4351337"/>
+          </a:xfrm>
+        </p:spPr>
         <p:txBody>
           <a:bodyPr/>
           <a:lstStyle/>
           <a:p>
             <a:r>
-              <a:rPr lang="en-US" dirty="0" smtClean="0"/>
-              <a:t>Experiment 1</a:t>
-            </a:r>
-          </a:p>
-          <a:p>
-            <a:pPr lvl="1"/>
-            <a:r>
-              <a:rPr lang="en-US" dirty="0" smtClean="0"/>
-              <a:t>Eye movement through a piece of text</a:t>
-            </a:r>
-          </a:p>
-          <a:p>
-            <a:r>
-              <a:rPr lang="en-US" dirty="0" smtClean="0"/>
-              <a:t>Experiment 2</a:t>
-            </a:r>
-          </a:p>
-          <a:p>
-            <a:pPr lvl="1"/>
-            <a:r>
-              <a:rPr lang="en-US" dirty="0" smtClean="0"/>
-              <a:t>What granularity we can expect from eye movement data</a:t>
-            </a:r>
-          </a:p>
-          <a:p>
-            <a:r>
-              <a:rPr lang="en-US" dirty="0" smtClean="0"/>
-              <a:t>Experiment 3</a:t>
-            </a:r>
-          </a:p>
-          <a:p>
-            <a:pPr lvl="1"/>
-            <a:r>
-              <a:rPr lang="en-US" dirty="0" smtClean="0"/>
-              <a:t>Does tracking follow the flow of your actual reading</a:t>
-            </a:r>
-          </a:p>
-          <a:p>
-            <a:pPr lvl="1"/>
-            <a:endParaRPr lang="en-US" dirty="0"/>
-          </a:p>
-          <a:p>
-            <a:r>
-              <a:rPr lang="en-US" dirty="0" smtClean="0"/>
-              <a:t>Su</a:t>
-            </a:r>
-            <a:endParaRPr lang="en-US" dirty="0"/>
-          </a:p>
-        </p:txBody>
-      </p:sp>
+              <a:rPr lang="en-US" dirty="0"/>
+              <a:t>C</a:t>
+            </a:r>
+            <a:r>
+              <a:rPr lang="en-US" dirty="0" smtClean="0"/>
+              <a:t>onfiguration time and reconfiguration requirement</a:t>
+            </a:r>
+          </a:p>
+          <a:p>
+            <a:r>
+              <a:rPr lang="en-US" dirty="0" smtClean="0"/>
+              <a:t>Assumption: user sit still and laptop at a fixed position</a:t>
+            </a:r>
+          </a:p>
+          <a:p>
+            <a:r>
+              <a:rPr lang="en-US" dirty="0" smtClean="0"/>
+              <a:t>Record configuration time</a:t>
+            </a:r>
+          </a:p>
+          <a:p>
+            <a:r>
+              <a:rPr lang="en-US" dirty="0" smtClean="0"/>
+              <a:t>Move head to different position</a:t>
+            </a:r>
+          </a:p>
+          <a:p>
+            <a:endParaRPr lang="en-US" dirty="0" smtClean="0"/>
+          </a:p>
+        </p:txBody>
+      </p:sp>
+      <p:pic>
+        <p:nvPicPr>
+          <p:cNvPr id="4" name="Picture 3"/>
+          <p:cNvPicPr>
+            <a:picLocks noChangeAspect="1"/>
+          </p:cNvPicPr>
+          <p:nvPr/>
+        </p:nvPicPr>
+        <p:blipFill>
+          <a:blip r:embed="rId2">
+            <a:extLst>
+              <a:ext uri="{28A0092B-C50C-407E-A947-70E740481C1C}">
+                <a14:useLocalDpi xmlns:a14="http://schemas.microsoft.com/office/drawing/2010/main" val="0"/>
+              </a:ext>
+            </a:extLst>
+          </a:blip>
+          <a:stretch>
+            <a:fillRect/>
+          </a:stretch>
+        </p:blipFill>
+        <p:spPr>
+          <a:xfrm>
+            <a:off x="5217620" y="2054088"/>
+            <a:ext cx="5736892" cy="4611768"/>
+          </a:xfrm>
+          <a:prstGeom prst="rect">
+            <a:avLst/>
+          </a:prstGeom>
+        </p:spPr>
+      </p:pic>
     </p:spTree>
     <p:extLst>
       <p:ext uri="{BB962C8B-B14F-4D97-AF65-F5344CB8AC3E}">
-        <p14:creationId xmlns:p14="http://schemas.microsoft.com/office/powerpoint/2010/main" val="1216513756"/>
+        <p14:creationId xmlns:p14="http://schemas.microsoft.com/office/powerpoint/2010/main" val="4017062202"/>
       </p:ext>
     </p:extLst>
   </p:cSld>
@@ -4635,7 +7341,7 @@
 </p:sld>
 </file>
 
-<file path=ppt/slides/slide6.xml><?xml version="1.0" encoding="utf-8"?>
+<file path=ppt/slides/slide9.xml><?xml version="1.0" encoding="utf-8"?>
 <p:sld xmlns:a="http://schemas.openxmlformats.org/drawingml/2006/main" xmlns:r="http://schemas.openxmlformats.org/officeDocument/2006/relationships" xmlns:p="http://schemas.openxmlformats.org/presentationml/2006/main">
   <p:cSld>
     <p:spTree>
@@ -4662,16 +7368,21 @@
             <p:ph type="title"/>
           </p:nvPr>
         </p:nvSpPr>
-        <p:spPr/>
+        <p:spPr>
+          <a:xfrm>
+            <a:off x="1261872" y="-230588"/>
+            <a:ext cx="9692640" cy="1325562"/>
+          </a:xfrm>
+        </p:spPr>
         <p:txBody>
           <a:bodyPr/>
           <a:lstStyle/>
           <a:p>
             <a:r>
-              <a:rPr lang="en-US" smtClean="0"/>
-              <a:t>Demo</a:t>
-            </a:r>
-            <a:endParaRPr lang="en-US"/>
+              <a:rPr lang="en-US" dirty="0" smtClean="0"/>
+              <a:t>Experiment 2</a:t>
+            </a:r>
+            <a:endParaRPr lang="en-US" dirty="0"/>
           </a:p>
         </p:txBody>
       </p:sp>
@@ -4685,181 +7396,101 @@
             <p:ph idx="1"/>
           </p:nvPr>
         </p:nvSpPr>
-        <p:spPr/>
+        <p:spPr>
+          <a:xfrm>
+            <a:off x="1261872" y="1232452"/>
+            <a:ext cx="8595360" cy="4351337"/>
+          </a:xfrm>
+        </p:spPr>
         <p:txBody>
           <a:bodyPr/>
           <a:lstStyle/>
           <a:p>
             <a:r>
               <a:rPr lang="en-US" dirty="0" smtClean="0"/>
-              <a:t>Best Case</a:t>
+              <a:t>Whether or not user are look at screen</a:t>
+            </a:r>
+          </a:p>
+          <a:p>
+            <a:r>
+              <a:rPr lang="en-US" dirty="0" smtClean="0"/>
+              <a:t>Assumption: head keep still just eye movement</a:t>
+            </a:r>
+          </a:p>
+          <a:p>
+            <a:r>
+              <a:rPr lang="en-US" dirty="0" smtClean="0"/>
+              <a:t>Look at 8 position outside the screen:</a:t>
             </a:r>
           </a:p>
           <a:p>
             <a:pPr lvl="1"/>
             <a:r>
               <a:rPr lang="en-US" dirty="0" smtClean="0"/>
-              <a:t>Set up a profile and allow person to look through a piece of text where the eye movements are tracked accurately</a:t>
-            </a:r>
-          </a:p>
-          <a:p>
-            <a:endParaRPr lang="en-US" dirty="0"/>
-          </a:p>
-          <a:p>
-            <a:r>
-              <a:rPr lang="en-US" dirty="0" err="1" smtClean="0"/>
-              <a:t>Suhas</a:t>
-            </a:r>
-            <a:endParaRPr lang="en-US" dirty="0" smtClean="0"/>
-          </a:p>
-          <a:p>
-            <a:endParaRPr lang="en-US" dirty="0"/>
+              <a:t>Up</a:t>
+            </a:r>
+          </a:p>
+          <a:p>
+            <a:pPr lvl="1"/>
+            <a:r>
+              <a:rPr lang="en-US" dirty="0" smtClean="0"/>
+              <a:t>Down</a:t>
+            </a:r>
+          </a:p>
+          <a:p>
+            <a:pPr lvl="1"/>
+            <a:r>
+              <a:rPr lang="en-US" dirty="0" smtClean="0"/>
+              <a:t>Left </a:t>
+            </a:r>
+          </a:p>
+          <a:p>
+            <a:pPr lvl="1"/>
+            <a:r>
+              <a:rPr lang="en-US" dirty="0" smtClean="0"/>
+              <a:t>Right</a:t>
+            </a:r>
+          </a:p>
+          <a:p>
+            <a:pPr lvl="1"/>
+            <a:r>
+              <a:rPr lang="en-US" dirty="0" smtClean="0"/>
+              <a:t>Up right corner</a:t>
+            </a:r>
+          </a:p>
+          <a:p>
+            <a:pPr lvl="1"/>
+            <a:r>
+              <a:rPr lang="en-US" dirty="0" smtClean="0"/>
+              <a:t>Up left corner</a:t>
+            </a:r>
+          </a:p>
+          <a:p>
+            <a:pPr lvl="1"/>
+            <a:r>
+              <a:rPr lang="en-US" dirty="0" smtClean="0"/>
+              <a:t>Down left corner</a:t>
+            </a:r>
+          </a:p>
+          <a:p>
+            <a:pPr lvl="1"/>
+            <a:r>
+              <a:rPr lang="en-US" dirty="0" smtClean="0"/>
+              <a:t>Down right corner</a:t>
+            </a:r>
           </a:p>
         </p:txBody>
       </p:sp>
     </p:spTree>
     <p:extLst>
       <p:ext uri="{BB962C8B-B14F-4D97-AF65-F5344CB8AC3E}">
-        <p14:creationId xmlns:p14="http://schemas.microsoft.com/office/powerpoint/2010/main" val="747479787"/>
+        <p14:creationId xmlns:p14="http://schemas.microsoft.com/office/powerpoint/2010/main" val="33737106"/>
       </p:ext>
     </p:extLst>
   </p:cSld>
   <p:clrMapOvr>
     <a:masterClrMapping/>
   </p:clrMapOvr>
-  <p:timing>
-    <p:tnLst>
-      <p:par>
-        <p:cTn id="1" dur="indefinite" restart="never" nodeType="tmRoot"/>
-      </p:par>
-    </p:tnLst>
-  </p:timing>
-</p:sld>
-</file>
-
-<file path=ppt/slides/slide7.xml><?xml version="1.0" encoding="utf-8"?>
-<p:sld xmlns:a="http://schemas.openxmlformats.org/drawingml/2006/main" xmlns:r="http://schemas.openxmlformats.org/officeDocument/2006/relationships" xmlns:p="http://schemas.openxmlformats.org/presentationml/2006/main">
-  <p:cSld>
-    <p:spTree>
-      <p:nvGrpSpPr>
-        <p:cNvPr id="1" name=""/>
-        <p:cNvGrpSpPr/>
-        <p:nvPr/>
-      </p:nvGrpSpPr>
-      <p:grpSpPr>
-        <a:xfrm>
-          <a:off x="0" y="0"/>
-          <a:ext cx="0" cy="0"/>
-          <a:chOff x="0" y="0"/>
-          <a:chExt cx="0" cy="0"/>
-        </a:xfrm>
-      </p:grpSpPr>
-      <p:sp>
-        <p:nvSpPr>
-          <p:cNvPr id="2" name="Title 1"/>
-          <p:cNvSpPr>
-            <a:spLocks noGrp="1"/>
-          </p:cNvSpPr>
-          <p:nvPr>
-            <p:ph type="title"/>
-          </p:nvPr>
-        </p:nvSpPr>
-        <p:spPr/>
-        <p:txBody>
-          <a:bodyPr/>
-          <a:lstStyle/>
-          <a:p>
-            <a:r>
-              <a:rPr lang="en-US" smtClean="0"/>
-              <a:t>Milestones</a:t>
-            </a:r>
-            <a:endParaRPr lang="en-US"/>
-          </a:p>
-        </p:txBody>
-      </p:sp>
-      <p:sp>
-        <p:nvSpPr>
-          <p:cNvPr id="3" name="Content Placeholder 2"/>
-          <p:cNvSpPr>
-            <a:spLocks noGrp="1"/>
-          </p:cNvSpPr>
-          <p:nvPr>
-            <p:ph idx="1"/>
-          </p:nvPr>
-        </p:nvSpPr>
-        <p:spPr/>
-        <p:txBody>
-          <a:bodyPr/>
-          <a:lstStyle/>
-          <a:p>
-            <a:r>
-              <a:rPr lang="en-US" dirty="0" smtClean="0"/>
-              <a:t>By end of October</a:t>
-            </a:r>
-          </a:p>
-          <a:p>
-            <a:pPr lvl="1"/>
-            <a:r>
-              <a:rPr lang="en-US" dirty="0" smtClean="0"/>
-              <a:t>Something</a:t>
-            </a:r>
-          </a:p>
-          <a:p>
-            <a:r>
-              <a:rPr lang="en-US" dirty="0" smtClean="0"/>
-              <a:t>By end of November</a:t>
-            </a:r>
-          </a:p>
-          <a:p>
-            <a:pPr lvl="1"/>
-            <a:r>
-              <a:rPr lang="en-US" dirty="0" smtClean="0"/>
-              <a:t>Something</a:t>
-            </a:r>
-          </a:p>
-          <a:p>
-            <a:r>
-              <a:rPr lang="en-US" dirty="0" smtClean="0"/>
-              <a:t>By end of first week in December</a:t>
-            </a:r>
-          </a:p>
-          <a:p>
-            <a:pPr lvl="1"/>
-            <a:r>
-              <a:rPr lang="en-US" dirty="0" smtClean="0"/>
-              <a:t>Done</a:t>
-            </a:r>
-          </a:p>
-          <a:p>
-            <a:pPr lvl="1"/>
-            <a:endParaRPr lang="en-US" dirty="0"/>
-          </a:p>
-          <a:p>
-            <a:r>
-              <a:rPr lang="en-US" dirty="0" err="1" smtClean="0"/>
-              <a:t>Ashkan</a:t>
-            </a:r>
-            <a:endParaRPr lang="en-US" dirty="0"/>
-          </a:p>
-        </p:txBody>
-      </p:sp>
-    </p:spTree>
-    <p:extLst>
-      <p:ext uri="{BB962C8B-B14F-4D97-AF65-F5344CB8AC3E}">
-        <p14:creationId xmlns:p14="http://schemas.microsoft.com/office/powerpoint/2010/main" val="488913587"/>
-      </p:ext>
-    </p:extLst>
-  </p:cSld>
-  <p:clrMapOvr>
-    <a:masterClrMapping/>
-  </p:clrMapOvr>
-  <p:timing>
-    <p:tnLst>
-      <p:par>
-        <p:cTn id="1" dur="indefinite" restart="never" nodeType="tmRoot"/>
-      </p:par>
-    </p:tnLst>
-  </p:timing>
 </p:sld>
 </file>
 

</xml_diff>